<commit_message>
Pushing stuff after exam
</commit_message>
<xml_diff>
--- a/Fall 2015/Lectures/Lecture 2 Simplex /Lecture_2_simplex.pptx
+++ b/Fall 2015/Lectures/Lecture 2 Simplex /Lecture_2_simplex.pptx
@@ -5,10 +5,10 @@
     <p:sldMasterId id="2147483648" r:id="rId1"/>
   </p:sldMasterIdLst>
   <p:notesMasterIdLst>
-    <p:notesMasterId r:id="rId21"/>
+    <p:notesMasterId r:id="rId22"/>
   </p:notesMasterIdLst>
   <p:handoutMasterIdLst>
-    <p:handoutMasterId r:id="rId22"/>
+    <p:handoutMasterId r:id="rId23"/>
   </p:handoutMasterIdLst>
   <p:sldIdLst>
     <p:sldId id="256" r:id="rId2"/>
@@ -17,19 +17,20 @@
     <p:sldId id="332" r:id="rId5"/>
     <p:sldId id="334" r:id="rId6"/>
     <p:sldId id="333" r:id="rId7"/>
-    <p:sldId id="328" r:id="rId8"/>
-    <p:sldId id="329" r:id="rId9"/>
-    <p:sldId id="330" r:id="rId10"/>
-    <p:sldId id="331" r:id="rId11"/>
-    <p:sldId id="313" r:id="rId12"/>
-    <p:sldId id="338" r:id="rId13"/>
-    <p:sldId id="339" r:id="rId14"/>
-    <p:sldId id="340" r:id="rId15"/>
-    <p:sldId id="341" r:id="rId16"/>
-    <p:sldId id="342" r:id="rId17"/>
-    <p:sldId id="346" r:id="rId18"/>
-    <p:sldId id="344" r:id="rId19"/>
-    <p:sldId id="345" r:id="rId20"/>
+    <p:sldId id="348" r:id="rId8"/>
+    <p:sldId id="328" r:id="rId9"/>
+    <p:sldId id="329" r:id="rId10"/>
+    <p:sldId id="330" r:id="rId11"/>
+    <p:sldId id="331" r:id="rId12"/>
+    <p:sldId id="313" r:id="rId13"/>
+    <p:sldId id="338" r:id="rId14"/>
+    <p:sldId id="339" r:id="rId15"/>
+    <p:sldId id="340" r:id="rId16"/>
+    <p:sldId id="341" r:id="rId17"/>
+    <p:sldId id="342" r:id="rId18"/>
+    <p:sldId id="346" r:id="rId19"/>
+    <p:sldId id="344" r:id="rId20"/>
+    <p:sldId id="345" r:id="rId21"/>
   </p:sldIdLst>
   <p:sldSz cx="6858000" cy="9144000" type="screen4x3"/>
   <p:notesSz cx="9296400" cy="7010400"/>
@@ -316,11 +317,11 @@
           <c:showPercent val="0"/>
           <c:showBubbleSize val="0"/>
         </c:dLbls>
-        <c:axId val="2114605048"/>
-        <c:axId val="2114608120"/>
+        <c:axId val="2119178920"/>
+        <c:axId val="2119214552"/>
       </c:scatterChart>
       <c:valAx>
-        <c:axId val="2114605048"/>
+        <c:axId val="2119178920"/>
         <c:scaling>
           <c:orientation val="minMax"/>
         </c:scaling>
@@ -330,12 +331,12 @@
         <c:majorTickMark val="out"/>
         <c:minorTickMark val="none"/>
         <c:tickLblPos val="nextTo"/>
-        <c:crossAx val="2114608120"/>
+        <c:crossAx val="2119214552"/>
         <c:crosses val="autoZero"/>
         <c:crossBetween val="midCat"/>
       </c:valAx>
       <c:valAx>
-        <c:axId val="2114608120"/>
+        <c:axId val="2119214552"/>
         <c:scaling>
           <c:orientation val="minMax"/>
         </c:scaling>
@@ -345,7 +346,7 @@
         <c:majorTickMark val="out"/>
         <c:minorTickMark val="none"/>
         <c:tickLblPos val="nextTo"/>
-        <c:crossAx val="2114605048"/>
+        <c:crossAx val="2119178920"/>
         <c:crosses val="autoZero"/>
         <c:crossBetween val="midCat"/>
       </c:valAx>
@@ -496,11 +497,11 @@
           <c:showPercent val="0"/>
           <c:showBubbleSize val="0"/>
         </c:dLbls>
-        <c:axId val="2114744376"/>
-        <c:axId val="2114747400"/>
+        <c:axId val="2119185912"/>
+        <c:axId val="2119301368"/>
       </c:scatterChart>
       <c:valAx>
-        <c:axId val="2114744376"/>
+        <c:axId val="2119185912"/>
         <c:scaling>
           <c:orientation val="minMax"/>
         </c:scaling>
@@ -510,12 +511,12 @@
         <c:majorTickMark val="out"/>
         <c:minorTickMark val="none"/>
         <c:tickLblPos val="nextTo"/>
-        <c:crossAx val="2114747400"/>
+        <c:crossAx val="2119301368"/>
         <c:crosses val="autoZero"/>
         <c:crossBetween val="midCat"/>
       </c:valAx>
       <c:valAx>
-        <c:axId val="2114747400"/>
+        <c:axId val="2119301368"/>
         <c:scaling>
           <c:orientation val="minMax"/>
         </c:scaling>
@@ -525,7 +526,7 @@
         <c:majorTickMark val="out"/>
         <c:minorTickMark val="none"/>
         <c:tickLblPos val="nextTo"/>
-        <c:crossAx val="2114744376"/>
+        <c:crossAx val="2119185912"/>
         <c:crosses val="autoZero"/>
         <c:crossBetween val="midCat"/>
       </c:valAx>
@@ -1976,6 +1977,95 @@
       </p:grpSpPr>
       <p:sp>
         <p:nvSpPr>
+          <p:cNvPr id="33794" name="Rectangle 7"/>
+          <p:cNvSpPr>
+            <a:spLocks noGrp="1" noChangeArrowheads="1"/>
+          </p:cNvSpPr>
+          <p:nvPr>
+            <p:ph type="sldNum" sz="quarter" idx="5"/>
+          </p:nvPr>
+        </p:nvSpPr>
+        <p:spPr>
+          <a:noFill/>
+        </p:spPr>
+        <p:txBody>
+          <a:bodyPr/>
+          <a:lstStyle/>
+          <a:p>
+            <a:fld id="{73313800-0E5A-C64D-9768-333F00C151AA}" type="slidenum">
+              <a:rPr lang="en-US"/>
+              <a:pPr/>
+              <a:t>7</a:t>
+            </a:fld>
+            <a:endParaRPr lang="en-US"/>
+          </a:p>
+        </p:txBody>
+      </p:sp>
+      <p:sp>
+        <p:nvSpPr>
+          <p:cNvPr id="33795" name="Rectangle 2"/>
+          <p:cNvSpPr>
+            <a:spLocks noGrp="1" noRot="1" noChangeAspect="1" noChangeArrowheads="1" noTextEdit="1"/>
+          </p:cNvSpPr>
+          <p:nvPr>
+            <p:ph type="sldImg"/>
+          </p:nvPr>
+        </p:nvSpPr>
+        <p:spPr>
+          <a:ln/>
+        </p:spPr>
+      </p:sp>
+      <p:sp>
+        <p:nvSpPr>
+          <p:cNvPr id="33796" name="Rectangle 3"/>
+          <p:cNvSpPr>
+            <a:spLocks noGrp="1" noChangeArrowheads="1"/>
+          </p:cNvSpPr>
+          <p:nvPr>
+            <p:ph type="body" idx="1"/>
+          </p:nvPr>
+        </p:nvSpPr>
+        <p:spPr>
+          <a:noFill/>
+          <a:ln/>
+        </p:spPr>
+        <p:txBody>
+          <a:bodyPr/>
+          <a:lstStyle/>
+          <a:p>
+            <a:endParaRPr lang="en-US">
+              <a:latin typeface="Times New Roman" charset="0"/>
+            </a:endParaRPr>
+          </a:p>
+        </p:txBody>
+      </p:sp>
+    </p:spTree>
+  </p:cSld>
+  <p:clrMapOvr>
+    <a:masterClrMapping/>
+  </p:clrMapOvr>
+</p:notes>
+</file>
+
+<file path=ppt/notesSlides/notesSlide5.xml><?xml version="1.0" encoding="utf-8"?>
+<p:notes xmlns:a="http://schemas.openxmlformats.org/drawingml/2006/main" xmlns:r="http://schemas.openxmlformats.org/officeDocument/2006/relationships" xmlns:p="http://schemas.openxmlformats.org/presentationml/2006/main">
+  <p:cSld>
+    <p:spTree>
+      <p:nvGrpSpPr>
+        <p:cNvPr id="1" name=""/>
+        <p:cNvGrpSpPr/>
+        <p:nvPr/>
+      </p:nvGrpSpPr>
+      <p:grpSpPr>
+        <a:xfrm>
+          <a:off x="0" y="0"/>
+          <a:ext cx="0" cy="0"/>
+          <a:chOff x="0" y="0"/>
+          <a:chExt cx="0" cy="0"/>
+        </a:xfrm>
+      </p:grpSpPr>
+      <p:sp>
+        <p:nvSpPr>
           <p:cNvPr id="30722" name="Rectangle 7"/>
           <p:cNvSpPr>
             <a:spLocks noGrp="1" noChangeArrowheads="1"/>
@@ -1994,7 +2084,7 @@
             <a:fld id="{16528743-1B77-C443-BAA9-A62A01A01843}" type="slidenum">
               <a:rPr lang="en-US"/>
               <a:pPr/>
-              <a:t>11</a:t>
+              <a:t>12</a:t>
             </a:fld>
             <a:endParaRPr lang="en-US"/>
           </a:p>
@@ -5854,6 +5944,626 @@
       </p:grpSpPr>
       <p:sp>
         <p:nvSpPr>
+          <p:cNvPr id="17411" name="Slide Number Placeholder 6"/>
+          <p:cNvSpPr>
+            <a:spLocks noGrp="1"/>
+          </p:cNvSpPr>
+          <p:nvPr>
+            <p:ph type="sldNum" sz="quarter" idx="12"/>
+          </p:nvPr>
+        </p:nvSpPr>
+        <p:spPr>
+          <a:noFill/>
+        </p:spPr>
+        <p:txBody>
+          <a:bodyPr/>
+          <a:lstStyle/>
+          <a:p>
+            <a:endParaRPr lang="en-US">
+              <a:latin typeface="Century Gothic" charset="0"/>
+            </a:endParaRPr>
+          </a:p>
+          <a:p>
+            <a:fld id="{9A5AC5BC-D237-A64D-A4AD-07301A1EFF4D}" type="slidenum">
+              <a:rPr lang="en-US">
+                <a:latin typeface="Century Gothic" charset="0"/>
+              </a:rPr>
+              <a:pPr/>
+              <a:t>10</a:t>
+            </a:fld>
+            <a:endParaRPr lang="en-US">
+              <a:latin typeface="Century Gothic" charset="0"/>
+            </a:endParaRPr>
+          </a:p>
+        </p:txBody>
+      </p:sp>
+      <p:sp>
+        <p:nvSpPr>
+          <p:cNvPr id="17412" name="Rectangle 2"/>
+          <p:cNvSpPr>
+            <a:spLocks noGrp="1" noChangeArrowheads="1"/>
+          </p:cNvSpPr>
+          <p:nvPr>
+            <p:ph type="title"/>
+          </p:nvPr>
+        </p:nvSpPr>
+        <p:spPr/>
+        <p:txBody>
+          <a:bodyPr/>
+          <a:lstStyle/>
+          <a:p>
+            <a:r>
+              <a:rPr lang="en-US">
+                <a:latin typeface="Century Gothic" charset="0"/>
+              </a:rPr>
+              <a:t>Special Cases of LP Solution:</a:t>
+            </a:r>
+            <a:br>
+              <a:rPr lang="en-US">
+                <a:latin typeface="Century Gothic" charset="0"/>
+              </a:rPr>
+            </a:br>
+            <a:r>
+              <a:rPr lang="en-US">
+                <a:latin typeface="Century Gothic" charset="0"/>
+              </a:rPr>
+              <a:t>Unbounded Problem</a:t>
+            </a:r>
+          </a:p>
+        </p:txBody>
+      </p:sp>
+      <p:sp>
+        <p:nvSpPr>
+          <p:cNvPr id="17413" name="Rectangle 3"/>
+          <p:cNvSpPr>
+            <a:spLocks noGrp="1" noChangeArrowheads="1"/>
+          </p:cNvSpPr>
+          <p:nvPr>
+            <p:ph type="body" sz="half" idx="1"/>
+          </p:nvPr>
+        </p:nvSpPr>
+        <p:spPr>
+          <a:xfrm>
+            <a:off x="533400" y="1905000"/>
+            <a:ext cx="5791200" cy="457200"/>
+          </a:xfrm>
+        </p:spPr>
+        <p:txBody>
+          <a:bodyPr/>
+          <a:lstStyle/>
+          <a:p>
+            <a:pPr>
+              <a:buFontTx/>
+              <a:buNone/>
+            </a:pPr>
+            <a:r>
+              <a:rPr lang="en-US" sz="1800">
+                <a:latin typeface="Century Gothic" charset="0"/>
+              </a:rPr>
+              <a:t>Suppose we have the following problem: </a:t>
+            </a:r>
+          </a:p>
+        </p:txBody>
+      </p:sp>
+      <p:sp>
+        <p:nvSpPr>
+          <p:cNvPr id="17414" name="Rectangle 4"/>
+          <p:cNvSpPr>
+            <a:spLocks noChangeArrowheads="1"/>
+          </p:cNvSpPr>
+          <p:nvPr/>
+        </p:nvSpPr>
+        <p:spPr bwMode="auto">
+          <a:xfrm>
+            <a:off x="1447800" y="2590800"/>
+            <a:ext cx="3429000" cy="1465263"/>
+          </a:xfrm>
+          <a:prstGeom prst="rect">
+            <a:avLst/>
+          </a:prstGeom>
+          <a:noFill/>
+          <a:ln w="9525">
+            <a:noFill/>
+            <a:miter lim="800000"/>
+            <a:headEnd/>
+            <a:tailEnd/>
+          </a:ln>
+        </p:spPr>
+        <p:txBody>
+          <a:bodyPr>
+            <a:prstTxWarp prst="textNoShape">
+              <a:avLst/>
+            </a:prstTxWarp>
+            <a:spAutoFit/>
+          </a:bodyPr>
+          <a:lstStyle/>
+          <a:p>
+            <a:pPr algn="l"/>
+            <a:r>
+              <a:rPr lang="en-US" dirty="0">
+                <a:solidFill>
+                  <a:schemeClr val="accent2"/>
+                </a:solidFill>
+                <a:latin typeface="Lucida Sans" charset="0"/>
+              </a:rPr>
+              <a:t>Maximize </a:t>
+            </a:r>
+            <a:r>
+              <a:rPr lang="en-US" i="1" dirty="0">
+                <a:solidFill>
+                  <a:schemeClr val="accent2"/>
+                </a:solidFill>
+                <a:latin typeface="Lucida Sans" charset="0"/>
+              </a:rPr>
+              <a:t>10 x</a:t>
+            </a:r>
+            <a:r>
+              <a:rPr lang="en-US" i="1" baseline="-25000" dirty="0">
+                <a:solidFill>
+                  <a:schemeClr val="accent2"/>
+                </a:solidFill>
+                <a:latin typeface="Lucida Sans" charset="0"/>
+              </a:rPr>
+              <a:t>1</a:t>
+            </a:r>
+            <a:r>
+              <a:rPr lang="en-US" i="1" dirty="0">
+                <a:solidFill>
+                  <a:schemeClr val="accent2"/>
+                </a:solidFill>
+                <a:latin typeface="Lucida Sans" charset="0"/>
+              </a:rPr>
+              <a:t> + 9 x</a:t>
+            </a:r>
+            <a:r>
+              <a:rPr lang="en-US" i="1" baseline="-25000" dirty="0">
+                <a:solidFill>
+                  <a:schemeClr val="accent2"/>
+                </a:solidFill>
+                <a:latin typeface="Lucida Sans" charset="0"/>
+              </a:rPr>
+              <a:t>2</a:t>
+            </a:r>
+          </a:p>
+          <a:p>
+            <a:pPr algn="l"/>
+            <a:r>
+              <a:rPr lang="en-US" dirty="0">
+                <a:latin typeface="Lucida Sans" charset="0"/>
+              </a:rPr>
+              <a:t>Such that: </a:t>
+            </a:r>
+          </a:p>
+          <a:p>
+            <a:pPr algn="l"/>
+            <a:r>
+              <a:rPr lang="en-US" dirty="0">
+                <a:latin typeface="Lucida Sans" charset="0"/>
+              </a:rPr>
+              <a:t>     </a:t>
+            </a:r>
+            <a:r>
+              <a:rPr lang="en-US" b="1" i="1" dirty="0">
+                <a:solidFill>
+                  <a:srgbClr val="FF3300"/>
+                </a:solidFill>
+                <a:latin typeface="Lucida Sans" charset="0"/>
+                <a:sym typeface="Symbol" charset="2"/>
+              </a:rPr>
+              <a:t>x</a:t>
+            </a:r>
+            <a:r>
+              <a:rPr lang="en-US" b="1" i="1" baseline="-25000" dirty="0">
+                <a:solidFill>
+                  <a:srgbClr val="FF3300"/>
+                </a:solidFill>
+                <a:latin typeface="Lucida Sans" charset="0"/>
+                <a:sym typeface="Symbol" charset="2"/>
+              </a:rPr>
+              <a:t>1</a:t>
+            </a:r>
+            <a:r>
+              <a:rPr lang="en-US" b="1" dirty="0">
+                <a:solidFill>
+                  <a:srgbClr val="FF3300"/>
+                </a:solidFill>
+                <a:latin typeface="Lucida Sans" charset="0"/>
+                <a:sym typeface="Symbol" charset="2"/>
+              </a:rPr>
+              <a:t>     +    </a:t>
+            </a:r>
+            <a:r>
+              <a:rPr lang="en-US" b="1" i="1" dirty="0">
+                <a:solidFill>
+                  <a:srgbClr val="FF3300"/>
+                </a:solidFill>
+                <a:latin typeface="Lucida Sans" charset="0"/>
+                <a:sym typeface="Symbol" charset="2"/>
+              </a:rPr>
+              <a:t>x</a:t>
+            </a:r>
+            <a:r>
+              <a:rPr lang="en-US" b="1" i="1" baseline="-25000" dirty="0">
+                <a:solidFill>
+                  <a:srgbClr val="FF3300"/>
+                </a:solidFill>
+                <a:latin typeface="Lucida Sans" charset="0"/>
+                <a:sym typeface="Symbol" charset="2"/>
+              </a:rPr>
+              <a:t>2</a:t>
+            </a:r>
+            <a:r>
+              <a:rPr lang="en-US" b="1" baseline="-25000" dirty="0">
+                <a:solidFill>
+                  <a:srgbClr val="FF3300"/>
+                </a:solidFill>
+                <a:latin typeface="Lucida Sans" charset="0"/>
+                <a:sym typeface="Symbol" charset="2"/>
+              </a:rPr>
+              <a:t> </a:t>
+            </a:r>
+            <a:r>
+              <a:rPr lang="en-US" b="1" dirty="0">
+                <a:solidFill>
+                  <a:srgbClr val="FF3300"/>
+                </a:solidFill>
+                <a:latin typeface="Lucida Sans" charset="0"/>
+                <a:sym typeface="Symbol" charset="2"/>
+              </a:rPr>
+              <a:t> </a:t>
+            </a:r>
+            <a:r>
+              <a:rPr lang="en-US" b="1" dirty="0" smtClean="0">
+                <a:solidFill>
+                  <a:srgbClr val="FF3300"/>
+                </a:solidFill>
+                <a:latin typeface="Lucida Sans" charset="0"/>
+                <a:sym typeface="Symbol" charset="2"/>
+              </a:rPr>
+              <a:t> ≥ </a:t>
+            </a:r>
+            <a:r>
+              <a:rPr lang="en-US" b="1" dirty="0">
+                <a:solidFill>
+                  <a:srgbClr val="FF3300"/>
+                </a:solidFill>
+                <a:latin typeface="Lucida Sans" charset="0"/>
+                <a:sym typeface="Symbol" charset="2"/>
+              </a:rPr>
+              <a:t>1000</a:t>
+            </a:r>
+            <a:r>
+              <a:rPr lang="en-US" b="1" dirty="0">
+                <a:latin typeface="Lucida Sans" charset="0"/>
+                <a:sym typeface="Symbol" charset="2"/>
+              </a:rPr>
+              <a:t> </a:t>
+            </a:r>
+            <a:endParaRPr lang="en-US" b="1" dirty="0">
+              <a:solidFill>
+                <a:schemeClr val="accent2"/>
+              </a:solidFill>
+              <a:latin typeface="Lucida Sans" charset="0"/>
+              <a:sym typeface="Symbol" charset="2"/>
+            </a:endParaRPr>
+          </a:p>
+          <a:p>
+            <a:pPr algn="l"/>
+            <a:r>
+              <a:rPr lang="en-US" b="1" dirty="0">
+                <a:solidFill>
+                  <a:schemeClr val="accent2"/>
+                </a:solidFill>
+                <a:latin typeface="Lucida Sans" charset="0"/>
+                <a:sym typeface="Symbol" charset="2"/>
+              </a:rPr>
+              <a:t>    </a:t>
+            </a:r>
+            <a:r>
+              <a:rPr lang="en-US" b="1" i="1" dirty="0">
+                <a:solidFill>
+                  <a:srgbClr val="FF3300"/>
+                </a:solidFill>
+                <a:latin typeface="Lucida Sans" charset="0"/>
+                <a:sym typeface="Symbol" charset="2"/>
+              </a:rPr>
+              <a:t>x</a:t>
+            </a:r>
+            <a:r>
+              <a:rPr lang="en-US" b="1" i="1" baseline="-25000" dirty="0">
+                <a:solidFill>
+                  <a:srgbClr val="FF3300"/>
+                </a:solidFill>
+                <a:latin typeface="Lucida Sans" charset="0"/>
+                <a:sym typeface="Symbol" charset="2"/>
+              </a:rPr>
+              <a:t>1</a:t>
+            </a:r>
+            <a:r>
+              <a:rPr lang="en-US" b="1" baseline="-25000" dirty="0">
+                <a:solidFill>
+                  <a:srgbClr val="FF3300"/>
+                </a:solidFill>
+                <a:latin typeface="Lucida Sans" charset="0"/>
+                <a:sym typeface="Symbol" charset="2"/>
+              </a:rPr>
+              <a:t> </a:t>
+            </a:r>
+            <a:r>
+              <a:rPr lang="en-US" b="1" dirty="0">
+                <a:solidFill>
+                  <a:srgbClr val="FF3300"/>
+                </a:solidFill>
+                <a:latin typeface="Lucida Sans" charset="0"/>
+                <a:sym typeface="Symbol" charset="2"/>
+              </a:rPr>
+              <a:t>                 </a:t>
+            </a:r>
+            <a:r>
+              <a:rPr lang="en-US" b="1" dirty="0" smtClean="0">
+                <a:solidFill>
+                  <a:srgbClr val="FF3300"/>
+                </a:solidFill>
+                <a:latin typeface="Lucida Sans" charset="0"/>
+                <a:sym typeface="Symbol" charset="2"/>
+              </a:rPr>
+              <a:t> ≥ </a:t>
+            </a:r>
+            <a:r>
+              <a:rPr lang="en-US" b="1" dirty="0">
+                <a:solidFill>
+                  <a:srgbClr val="FF3300"/>
+                </a:solidFill>
+                <a:latin typeface="Lucida Sans" charset="0"/>
+                <a:sym typeface="Symbol" charset="2"/>
+              </a:rPr>
+              <a:t>725</a:t>
+            </a:r>
+            <a:endParaRPr lang="en-US" b="1" i="1" dirty="0">
+              <a:solidFill>
+                <a:schemeClr val="accent2"/>
+              </a:solidFill>
+              <a:latin typeface="Lucida Sans" charset="0"/>
+              <a:sym typeface="Symbol" charset="2"/>
+            </a:endParaRPr>
+          </a:p>
+          <a:p>
+            <a:pPr algn="l"/>
+            <a:r>
+              <a:rPr lang="en-US" dirty="0">
+                <a:latin typeface="Lucida Sans" charset="0"/>
+              </a:rPr>
+              <a:t>   </a:t>
+            </a:r>
+            <a:r>
+              <a:rPr lang="en-US" i="1" dirty="0">
+                <a:solidFill>
+                  <a:schemeClr val="accent2"/>
+                </a:solidFill>
+                <a:latin typeface="Lucida Sans" charset="0"/>
+              </a:rPr>
+              <a:t>x</a:t>
+            </a:r>
+            <a:r>
+              <a:rPr lang="en-US" i="1" baseline="-25000" dirty="0">
+                <a:solidFill>
+                  <a:schemeClr val="accent2"/>
+                </a:solidFill>
+                <a:latin typeface="Lucida Sans" charset="0"/>
+              </a:rPr>
+              <a:t>1</a:t>
+            </a:r>
+            <a:r>
+              <a:rPr lang="en-US" i="1" dirty="0" smtClean="0">
+                <a:solidFill>
+                  <a:schemeClr val="accent2"/>
+                </a:solidFill>
+                <a:latin typeface="Lucida Sans" charset="0"/>
+              </a:rPr>
+              <a:t> ≥</a:t>
+            </a:r>
+            <a:r>
+              <a:rPr lang="en-US" dirty="0" smtClean="0">
+                <a:solidFill>
+                  <a:schemeClr val="accent2"/>
+                </a:solidFill>
+                <a:latin typeface="Lucida Sans" charset="0"/>
+                <a:sym typeface="Symbol" charset="2"/>
+              </a:rPr>
+              <a:t> </a:t>
+            </a:r>
+            <a:r>
+              <a:rPr lang="en-US" dirty="0">
+                <a:solidFill>
+                  <a:schemeClr val="accent2"/>
+                </a:solidFill>
+                <a:latin typeface="Lucida Sans" charset="0"/>
+                <a:sym typeface="Symbol" charset="2"/>
+              </a:rPr>
+              <a:t>0</a:t>
+            </a:r>
+            <a:r>
+              <a:rPr lang="en-US" dirty="0">
+                <a:solidFill>
+                  <a:schemeClr val="accent2"/>
+                </a:solidFill>
+                <a:latin typeface="Lucida Sans" charset="0"/>
+              </a:rPr>
+              <a:t> ,</a:t>
+            </a:r>
+            <a:r>
+              <a:rPr lang="en-US" i="1" dirty="0">
+                <a:solidFill>
+                  <a:schemeClr val="accent2"/>
+                </a:solidFill>
+                <a:latin typeface="Lucida Sans" charset="0"/>
+              </a:rPr>
+              <a:t>      x</a:t>
+            </a:r>
+            <a:r>
+              <a:rPr lang="en-US" i="1" baseline="-25000" dirty="0">
+                <a:solidFill>
+                  <a:schemeClr val="accent2"/>
+                </a:solidFill>
+                <a:latin typeface="Lucida Sans" charset="0"/>
+              </a:rPr>
+              <a:t>2</a:t>
+            </a:r>
+            <a:r>
+              <a:rPr lang="en-US" i="1" dirty="0">
+                <a:solidFill>
+                  <a:schemeClr val="accent2"/>
+                </a:solidFill>
+                <a:latin typeface="Lucida Sans" charset="0"/>
+              </a:rPr>
+              <a:t> </a:t>
+            </a:r>
+            <a:r>
+              <a:rPr lang="en-US" i="1" dirty="0" smtClean="0">
+                <a:solidFill>
+                  <a:schemeClr val="accent2"/>
+                </a:solidFill>
+                <a:latin typeface="Lucida Sans" charset="0"/>
+              </a:rPr>
+              <a:t> ≥</a:t>
+            </a:r>
+            <a:r>
+              <a:rPr lang="en-US" dirty="0" smtClean="0">
+                <a:solidFill>
+                  <a:schemeClr val="accent2"/>
+                </a:solidFill>
+                <a:latin typeface="Lucida Sans" charset="0"/>
+                <a:sym typeface="Symbol" charset="2"/>
+              </a:rPr>
+              <a:t> </a:t>
+            </a:r>
+            <a:r>
+              <a:rPr lang="en-US" dirty="0">
+                <a:solidFill>
+                  <a:schemeClr val="accent2"/>
+                </a:solidFill>
+                <a:latin typeface="Lucida Sans" charset="0"/>
+                <a:sym typeface="Symbol" charset="2"/>
+              </a:rPr>
+              <a:t>0</a:t>
+            </a:r>
+          </a:p>
+        </p:txBody>
+      </p:sp>
+      <p:pic>
+        <p:nvPicPr>
+          <p:cNvPr id="17415" name="Picture 9"/>
+          <p:cNvPicPr>
+            <a:picLocks noChangeAspect="1" noChangeArrowheads="1"/>
+          </p:cNvPicPr>
+          <p:nvPr/>
+        </p:nvPicPr>
+        <p:blipFill>
+          <a:blip r:embed="rId2" cstate="print"/>
+          <a:srcRect/>
+          <a:stretch>
+            <a:fillRect/>
+          </a:stretch>
+        </p:blipFill>
+        <p:spPr bwMode="auto">
+          <a:xfrm>
+            <a:off x="228600" y="4495800"/>
+            <a:ext cx="6400800" cy="3165475"/>
+          </a:xfrm>
+          <a:prstGeom prst="rect">
+            <a:avLst/>
+          </a:prstGeom>
+          <a:noFill/>
+          <a:ln w="9525">
+            <a:noFill/>
+            <a:miter lim="800000"/>
+            <a:headEnd/>
+            <a:tailEnd/>
+          </a:ln>
+        </p:spPr>
+      </p:pic>
+      <p:sp>
+        <p:nvSpPr>
+          <p:cNvPr id="17416" name="Date Placeholder 3"/>
+          <p:cNvSpPr>
+            <a:spLocks noGrp="1"/>
+          </p:cNvSpPr>
+          <p:nvPr>
+            <p:ph type="dt" sz="quarter" idx="10"/>
+          </p:nvPr>
+        </p:nvSpPr>
+        <p:spPr>
+          <a:noFill/>
+        </p:spPr>
+        <p:txBody>
+          <a:bodyPr/>
+          <a:lstStyle/>
+          <a:p>
+            <a:r>
+              <a:rPr lang="en-US" smtClean="0"/>
+              <a:t>9/11/2013, 9/16/2013</a:t>
+            </a:r>
+            <a:endParaRPr lang="en-US" dirty="0"/>
+          </a:p>
+        </p:txBody>
+      </p:sp>
+      <p:sp>
+        <p:nvSpPr>
+          <p:cNvPr id="8" name="Footer Placeholder 7"/>
+          <p:cNvSpPr>
+            <a:spLocks noGrp="1"/>
+          </p:cNvSpPr>
+          <p:nvPr>
+            <p:ph type="ftr" sz="quarter" idx="11"/>
+          </p:nvPr>
+        </p:nvSpPr>
+        <p:spPr/>
+        <p:txBody>
+          <a:bodyPr/>
+          <a:lstStyle/>
+          <a:p>
+            <a:r>
+              <a:rPr lang="en-US" smtClean="0"/>
+              <a:t>Professor Dong Washington University, St. Louis, MO</a:t>
+            </a:r>
+            <a:endParaRPr lang="en-US" dirty="0"/>
+          </a:p>
+        </p:txBody>
+      </p:sp>
+    </p:spTree>
+  </p:cSld>
+  <p:clrMapOvr>
+    <a:masterClrMapping/>
+  </p:clrMapOvr>
+  <p:timing>
+    <p:tnLst>
+      <p:par>
+        <p:cTn xmlns:p14="http://schemas.microsoft.com/office/powerpoint/2010/main" id="1" dur="indefinite" restart="never" nodeType="tmRoot"/>
+      </p:par>
+    </p:tnLst>
+  </p:timing>
+</p:sld>
+</file>
+
+<file path=ppt/slides/slide11.xml><?xml version="1.0" encoding="utf-8"?>
+<p:sld xmlns:a="http://schemas.openxmlformats.org/drawingml/2006/main" xmlns:r="http://schemas.openxmlformats.org/officeDocument/2006/relationships" xmlns:p="http://schemas.openxmlformats.org/presentationml/2006/main">
+  <p:cSld>
+    <p:spTree>
+      <p:nvGrpSpPr>
+        <p:cNvPr id="1" name=""/>
+        <p:cNvGrpSpPr/>
+        <p:nvPr/>
+      </p:nvGrpSpPr>
+      <p:grpSpPr>
+        <a:xfrm>
+          <a:off x="0" y="0"/>
+          <a:ext cx="0" cy="0"/>
+          <a:chOff x="0" y="0"/>
+          <a:chExt cx="0" cy="0"/>
+        </a:xfrm>
+      </p:grpSpPr>
+      <p:sp>
+        <p:nvSpPr>
           <p:cNvPr id="18435" name="Slide Number Placeholder 5"/>
           <p:cNvSpPr>
             <a:spLocks noGrp="1"/>
@@ -5879,7 +6589,7 @@
                 <a:latin typeface="Century Gothic" charset="0"/>
               </a:rPr>
               <a:pPr/>
-              <a:t>10</a:t>
+              <a:t>11</a:t>
             </a:fld>
             <a:endParaRPr lang="en-US">
               <a:latin typeface="Century Gothic" charset="0"/>
@@ -7701,7 +8411,7 @@
 </p:sld>
 </file>
 
-<file path=ppt/slides/slide11.xml><?xml version="1.0" encoding="utf-8"?>
+<file path=ppt/slides/slide12.xml><?xml version="1.0" encoding="utf-8"?>
 <p:sld xmlns:a="http://schemas.openxmlformats.org/drawingml/2006/main" xmlns:r="http://schemas.openxmlformats.org/officeDocument/2006/relationships" xmlns:p="http://schemas.openxmlformats.org/presentationml/2006/main">
   <p:cSld>
     <p:spTree>
@@ -7745,7 +8455,7 @@
                 <a:latin typeface="Century Gothic" charset="0"/>
               </a:rPr>
               <a:pPr/>
-              <a:t>11</a:t>
+              <a:t>12</a:t>
             </a:fld>
             <a:endParaRPr lang="en-US">
               <a:latin typeface="Century Gothic" charset="0"/>
@@ -8179,7 +8889,7 @@
 </p:sld>
 </file>
 
-<file path=ppt/slides/slide12.xml><?xml version="1.0" encoding="utf-8"?>
+<file path=ppt/slides/slide13.xml><?xml version="1.0" encoding="utf-8"?>
 <p:sld xmlns:a="http://schemas.openxmlformats.org/drawingml/2006/main" xmlns:r="http://schemas.openxmlformats.org/officeDocument/2006/relationships" xmlns:p="http://schemas.openxmlformats.org/presentationml/2006/main">
   <p:cSld>
     <p:spTree>
@@ -8950,7 +9660,7 @@
                 <a:latin typeface="Century Gothic" charset="0"/>
               </a:rPr>
               <a:pPr/>
-              <a:t>12</a:t>
+              <a:t>13</a:t>
             </a:fld>
             <a:endParaRPr lang="en-US">
               <a:latin typeface="Century Gothic" charset="0"/>
@@ -9056,7 +9766,7 @@
 </p:sld>
 </file>
 
-<file path=ppt/slides/slide13.xml><?xml version="1.0" encoding="utf-8"?>
+<file path=ppt/slides/slide14.xml><?xml version="1.0" encoding="utf-8"?>
 <p:sld xmlns:a="http://schemas.openxmlformats.org/drawingml/2006/main" xmlns:r="http://schemas.openxmlformats.org/officeDocument/2006/relationships" xmlns:p="http://schemas.openxmlformats.org/presentationml/2006/main">
   <p:cSld>
     <p:spTree>
@@ -9239,7 +9949,7 @@
                 <a:latin typeface="Century Gothic" charset="0"/>
               </a:rPr>
               <a:pPr/>
-              <a:t>13</a:t>
+              <a:t>14</a:t>
             </a:fld>
             <a:endParaRPr lang="en-US">
               <a:latin typeface="Century Gothic" charset="0"/>
@@ -9279,266 +9989,6 @@
       <p:sp>
         <p:nvSpPr>
           <p:cNvPr id="15" name="Footer Placeholder 6"/>
-          <p:cNvSpPr>
-            <a:spLocks noGrp="1"/>
-          </p:cNvSpPr>
-          <p:nvPr>
-            <p:ph type="ftr" sz="quarter" idx="11"/>
-          </p:nvPr>
-        </p:nvSpPr>
-        <p:spPr>
-          <a:xfrm>
-            <a:off x="1752600" y="8305800"/>
-            <a:ext cx="3352800" cy="609600"/>
-          </a:xfrm>
-        </p:spPr>
-        <p:txBody>
-          <a:bodyPr/>
-          <a:lstStyle/>
-          <a:p>
-            <a:r>
-              <a:rPr lang="en-US" smtClean="0"/>
-              <a:t>Professor Dong Washington University, St. Louis, MO</a:t>
-            </a:r>
-            <a:endParaRPr lang="en-US" dirty="0"/>
-          </a:p>
-        </p:txBody>
-      </p:sp>
-    </p:spTree>
-  </p:cSld>
-  <p:clrMapOvr>
-    <a:masterClrMapping/>
-  </p:clrMapOvr>
-  <p:timing>
-    <p:tnLst>
-      <p:par>
-        <p:cTn xmlns:p14="http://schemas.microsoft.com/office/powerpoint/2010/main" id="1" dur="indefinite" restart="never" nodeType="tmRoot"/>
-      </p:par>
-    </p:tnLst>
-  </p:timing>
-</p:sld>
-</file>
-
-<file path=ppt/slides/slide14.xml><?xml version="1.0" encoding="utf-8"?>
-<p:sld xmlns:a="http://schemas.openxmlformats.org/drawingml/2006/main" xmlns:r="http://schemas.openxmlformats.org/officeDocument/2006/relationships" xmlns:p="http://schemas.openxmlformats.org/presentationml/2006/main">
-  <p:cSld>
-    <p:spTree>
-      <p:nvGrpSpPr>
-        <p:cNvPr id="1" name=""/>
-        <p:cNvGrpSpPr/>
-        <p:nvPr/>
-      </p:nvGrpSpPr>
-      <p:grpSpPr>
-        <a:xfrm>
-          <a:off x="0" y="0"/>
-          <a:ext cx="0" cy="0"/>
-          <a:chOff x="0" y="0"/>
-          <a:chExt cx="0" cy="0"/>
-        </a:xfrm>
-      </p:grpSpPr>
-      <p:sp>
-        <p:nvSpPr>
-          <p:cNvPr id="2" name="Title 1"/>
-          <p:cNvSpPr>
-            <a:spLocks noGrp="1"/>
-          </p:cNvSpPr>
-          <p:nvPr>
-            <p:ph type="title"/>
-          </p:nvPr>
-        </p:nvSpPr>
-        <p:spPr/>
-        <p:txBody>
-          <a:bodyPr/>
-          <a:lstStyle/>
-          <a:p>
-            <a:r>
-              <a:rPr lang="en-US" dirty="0" smtClean="0"/>
-              <a:t>RV: Diseconomy of Scale</a:t>
-            </a:r>
-            <a:endParaRPr lang="en-US" dirty="0"/>
-          </a:p>
-        </p:txBody>
-      </p:sp>
-      <p:sp>
-        <p:nvSpPr>
-          <p:cNvPr id="3" name="Content Placeholder 2"/>
-          <p:cNvSpPr>
-            <a:spLocks noGrp="1"/>
-          </p:cNvSpPr>
-          <p:nvPr>
-            <p:ph idx="1"/>
-          </p:nvPr>
-        </p:nvSpPr>
-        <p:spPr>
-          <a:effectLst>
-            <a:outerShdw blurRad="50800" dist="38100" dir="2700000" algn="tl" rotWithShape="0">
-              <a:prstClr val="black">
-                <a:alpha val="40000"/>
-              </a:prstClr>
-            </a:outerShdw>
-          </a:effectLst>
-        </p:spPr>
-        <p:style>
-          <a:lnRef idx="1">
-            <a:schemeClr val="accent3"/>
-          </a:lnRef>
-          <a:fillRef idx="2">
-            <a:schemeClr val="accent3"/>
-          </a:fillRef>
-          <a:effectRef idx="1">
-            <a:schemeClr val="accent3"/>
-          </a:effectRef>
-          <a:fontRef idx="minor">
-            <a:schemeClr val="dk1"/>
-          </a:fontRef>
-        </p:style>
-        <p:txBody>
-          <a:bodyPr/>
-          <a:lstStyle/>
-          <a:p>
-            <a:pPr>
-              <a:buNone/>
-            </a:pPr>
-            <a:r>
-              <a:rPr lang="en-US" dirty="0" smtClean="0">
-                <a:latin typeface="Century Gothic" pitchFamily="34" charset="0"/>
-              </a:rPr>
-              <a:t>	</a:t>
-            </a:r>
-            <a:r>
-              <a:rPr lang="en-US" b="1" dirty="0" smtClean="0">
-                <a:latin typeface="Century Gothic" pitchFamily="34" charset="0"/>
-              </a:rPr>
-              <a:t>Suppose the data in the RV example are exactly as before with this exception: Each of the first 12 units of the Standard model vehicle has $840 as its contribution, and any units in excess of 12 have a contribution of $500 each. What product mix maximizes the total contribution?</a:t>
-            </a:r>
-          </a:p>
-          <a:p>
-            <a:pPr>
-              <a:buNone/>
-            </a:pPr>
-            <a:endParaRPr lang="en-US" dirty="0" smtClean="0">
-              <a:latin typeface="Century Gothic" pitchFamily="34" charset="0"/>
-            </a:endParaRPr>
-          </a:p>
-          <a:p>
-            <a:pPr>
-              <a:buNone/>
-            </a:pPr>
-            <a:endParaRPr lang="en-US" dirty="0" smtClean="0">
-              <a:latin typeface="Century Gothic" pitchFamily="34" charset="0"/>
-            </a:endParaRPr>
-          </a:p>
-          <a:p>
-            <a:pPr>
-              <a:buNone/>
-            </a:pPr>
-            <a:endParaRPr lang="en-US" dirty="0" smtClean="0">
-              <a:latin typeface="Century Gothic" pitchFamily="34" charset="0"/>
-            </a:endParaRPr>
-          </a:p>
-          <a:p>
-            <a:pPr>
-              <a:buNone/>
-            </a:pPr>
-            <a:r>
-              <a:rPr lang="en-US" dirty="0" smtClean="0">
-                <a:latin typeface="Century Gothic" pitchFamily="34" charset="0"/>
-              </a:rPr>
-              <a:t> </a:t>
-            </a:r>
-            <a:endParaRPr lang="en-US" dirty="0">
-              <a:latin typeface="Century Gothic" pitchFamily="34" charset="0"/>
-            </a:endParaRPr>
-          </a:p>
-        </p:txBody>
-      </p:sp>
-      <p:graphicFrame>
-        <p:nvGraphicFramePr>
-          <p:cNvPr id="6" name="Chart 5"/>
-          <p:cNvGraphicFramePr/>
-          <p:nvPr/>
-        </p:nvGraphicFramePr>
-        <p:xfrm>
-          <a:off x="1219200" y="4572000"/>
-          <a:ext cx="4572000" cy="2743200"/>
-        </p:xfrm>
-        <a:graphic>
-          <a:graphicData uri="http://schemas.openxmlformats.org/drawingml/2006/chart">
-            <c:chart xmlns:c="http://schemas.openxmlformats.org/drawingml/2006/chart" xmlns:r="http://schemas.openxmlformats.org/officeDocument/2006/relationships" r:id="rId2"/>
-          </a:graphicData>
-        </a:graphic>
-      </p:graphicFrame>
-      <p:sp>
-        <p:nvSpPr>
-          <p:cNvPr id="8" name="Slide Number Placeholder 5"/>
-          <p:cNvSpPr>
-            <a:spLocks noGrp="1"/>
-          </p:cNvSpPr>
-          <p:nvPr>
-            <p:ph type="sldNum" sz="quarter" idx="12"/>
-          </p:nvPr>
-        </p:nvSpPr>
-        <p:spPr>
-          <a:xfrm>
-            <a:off x="4914900" y="8305800"/>
-            <a:ext cx="1428750" cy="609600"/>
-          </a:xfrm>
-          <a:noFill/>
-        </p:spPr>
-        <p:txBody>
-          <a:bodyPr/>
-          <a:lstStyle/>
-          <a:p>
-            <a:endParaRPr lang="en-US">
-              <a:latin typeface="Century Gothic" charset="0"/>
-            </a:endParaRPr>
-          </a:p>
-          <a:p>
-            <a:fld id="{EFD830E9-A73D-D545-B65C-C94B6CA2D212}" type="slidenum">
-              <a:rPr lang="en-US">
-                <a:latin typeface="Century Gothic" charset="0"/>
-              </a:rPr>
-              <a:pPr/>
-              <a:t>14</a:t>
-            </a:fld>
-            <a:endParaRPr lang="en-US">
-              <a:latin typeface="Century Gothic" charset="0"/>
-            </a:endParaRPr>
-          </a:p>
-        </p:txBody>
-      </p:sp>
-      <p:sp>
-        <p:nvSpPr>
-          <p:cNvPr id="9" name="Date Placeholder 3"/>
-          <p:cNvSpPr>
-            <a:spLocks noGrp="1"/>
-          </p:cNvSpPr>
-          <p:nvPr>
-            <p:ph type="dt" sz="quarter" idx="10"/>
-          </p:nvPr>
-        </p:nvSpPr>
-        <p:spPr>
-          <a:xfrm>
-            <a:off x="514350" y="8305800"/>
-            <a:ext cx="1428750" cy="609600"/>
-          </a:xfrm>
-          <a:noFill/>
-        </p:spPr>
-        <p:txBody>
-          <a:bodyPr/>
-          <a:lstStyle/>
-          <a:p>
-            <a:r>
-              <a:rPr lang="en-US" smtClean="0"/>
-              <a:t>9/11/2013, 9/16/2013</a:t>
-            </a:r>
-            <a:endParaRPr lang="en-US" dirty="0"/>
-          </a:p>
-        </p:txBody>
-      </p:sp>
-      <p:sp>
-        <p:nvSpPr>
-          <p:cNvPr id="10" name="Footer Placeholder 6"/>
           <p:cNvSpPr>
             <a:spLocks noGrp="1"/>
           </p:cNvSpPr>
@@ -9613,6 +10063,266 @@
           <a:p>
             <a:r>
               <a:rPr lang="en-US" dirty="0" smtClean="0"/>
+              <a:t>RV: Diseconomy of Scale</a:t>
+            </a:r>
+            <a:endParaRPr lang="en-US" dirty="0"/>
+          </a:p>
+        </p:txBody>
+      </p:sp>
+      <p:sp>
+        <p:nvSpPr>
+          <p:cNvPr id="3" name="Content Placeholder 2"/>
+          <p:cNvSpPr>
+            <a:spLocks noGrp="1"/>
+          </p:cNvSpPr>
+          <p:nvPr>
+            <p:ph idx="1"/>
+          </p:nvPr>
+        </p:nvSpPr>
+        <p:spPr>
+          <a:effectLst>
+            <a:outerShdw blurRad="50800" dist="38100" dir="2700000" algn="tl" rotWithShape="0">
+              <a:prstClr val="black">
+                <a:alpha val="40000"/>
+              </a:prstClr>
+            </a:outerShdw>
+          </a:effectLst>
+        </p:spPr>
+        <p:style>
+          <a:lnRef idx="1">
+            <a:schemeClr val="accent3"/>
+          </a:lnRef>
+          <a:fillRef idx="2">
+            <a:schemeClr val="accent3"/>
+          </a:fillRef>
+          <a:effectRef idx="1">
+            <a:schemeClr val="accent3"/>
+          </a:effectRef>
+          <a:fontRef idx="minor">
+            <a:schemeClr val="dk1"/>
+          </a:fontRef>
+        </p:style>
+        <p:txBody>
+          <a:bodyPr/>
+          <a:lstStyle/>
+          <a:p>
+            <a:pPr>
+              <a:buNone/>
+            </a:pPr>
+            <a:r>
+              <a:rPr lang="en-US" dirty="0" smtClean="0">
+                <a:latin typeface="Century Gothic" pitchFamily="34" charset="0"/>
+              </a:rPr>
+              <a:t>	</a:t>
+            </a:r>
+            <a:r>
+              <a:rPr lang="en-US" b="1" dirty="0" smtClean="0">
+                <a:latin typeface="Century Gothic" pitchFamily="34" charset="0"/>
+              </a:rPr>
+              <a:t>Suppose the data in the RV example are exactly as before with this exception: Each of the first 12 units of the Standard model vehicle has $840 as its contribution, and any units in excess of 12 have a contribution of $500 each. What product mix maximizes the total contribution?</a:t>
+            </a:r>
+          </a:p>
+          <a:p>
+            <a:pPr>
+              <a:buNone/>
+            </a:pPr>
+            <a:endParaRPr lang="en-US" dirty="0" smtClean="0">
+              <a:latin typeface="Century Gothic" pitchFamily="34" charset="0"/>
+            </a:endParaRPr>
+          </a:p>
+          <a:p>
+            <a:pPr>
+              <a:buNone/>
+            </a:pPr>
+            <a:endParaRPr lang="en-US" dirty="0" smtClean="0">
+              <a:latin typeface="Century Gothic" pitchFamily="34" charset="0"/>
+            </a:endParaRPr>
+          </a:p>
+          <a:p>
+            <a:pPr>
+              <a:buNone/>
+            </a:pPr>
+            <a:endParaRPr lang="en-US" dirty="0" smtClean="0">
+              <a:latin typeface="Century Gothic" pitchFamily="34" charset="0"/>
+            </a:endParaRPr>
+          </a:p>
+          <a:p>
+            <a:pPr>
+              <a:buNone/>
+            </a:pPr>
+            <a:r>
+              <a:rPr lang="en-US" dirty="0" smtClean="0">
+                <a:latin typeface="Century Gothic" pitchFamily="34" charset="0"/>
+              </a:rPr>
+              <a:t> </a:t>
+            </a:r>
+            <a:endParaRPr lang="en-US" dirty="0">
+              <a:latin typeface="Century Gothic" pitchFamily="34" charset="0"/>
+            </a:endParaRPr>
+          </a:p>
+        </p:txBody>
+      </p:sp>
+      <p:graphicFrame>
+        <p:nvGraphicFramePr>
+          <p:cNvPr id="6" name="Chart 5"/>
+          <p:cNvGraphicFramePr/>
+          <p:nvPr/>
+        </p:nvGraphicFramePr>
+        <p:xfrm>
+          <a:off x="1219200" y="4572000"/>
+          <a:ext cx="4572000" cy="2743200"/>
+        </p:xfrm>
+        <a:graphic>
+          <a:graphicData uri="http://schemas.openxmlformats.org/drawingml/2006/chart">
+            <c:chart xmlns:c="http://schemas.openxmlformats.org/drawingml/2006/chart" xmlns:r="http://schemas.openxmlformats.org/officeDocument/2006/relationships" r:id="rId2"/>
+          </a:graphicData>
+        </a:graphic>
+      </p:graphicFrame>
+      <p:sp>
+        <p:nvSpPr>
+          <p:cNvPr id="8" name="Slide Number Placeholder 5"/>
+          <p:cNvSpPr>
+            <a:spLocks noGrp="1"/>
+          </p:cNvSpPr>
+          <p:nvPr>
+            <p:ph type="sldNum" sz="quarter" idx="12"/>
+          </p:nvPr>
+        </p:nvSpPr>
+        <p:spPr>
+          <a:xfrm>
+            <a:off x="4914900" y="8305800"/>
+            <a:ext cx="1428750" cy="609600"/>
+          </a:xfrm>
+          <a:noFill/>
+        </p:spPr>
+        <p:txBody>
+          <a:bodyPr/>
+          <a:lstStyle/>
+          <a:p>
+            <a:endParaRPr lang="en-US">
+              <a:latin typeface="Century Gothic" charset="0"/>
+            </a:endParaRPr>
+          </a:p>
+          <a:p>
+            <a:fld id="{EFD830E9-A73D-D545-B65C-C94B6CA2D212}" type="slidenum">
+              <a:rPr lang="en-US">
+                <a:latin typeface="Century Gothic" charset="0"/>
+              </a:rPr>
+              <a:pPr/>
+              <a:t>15</a:t>
+            </a:fld>
+            <a:endParaRPr lang="en-US">
+              <a:latin typeface="Century Gothic" charset="0"/>
+            </a:endParaRPr>
+          </a:p>
+        </p:txBody>
+      </p:sp>
+      <p:sp>
+        <p:nvSpPr>
+          <p:cNvPr id="9" name="Date Placeholder 3"/>
+          <p:cNvSpPr>
+            <a:spLocks noGrp="1"/>
+          </p:cNvSpPr>
+          <p:nvPr>
+            <p:ph type="dt" sz="quarter" idx="10"/>
+          </p:nvPr>
+        </p:nvSpPr>
+        <p:spPr>
+          <a:xfrm>
+            <a:off x="514350" y="8305800"/>
+            <a:ext cx="1428750" cy="609600"/>
+          </a:xfrm>
+          <a:noFill/>
+        </p:spPr>
+        <p:txBody>
+          <a:bodyPr/>
+          <a:lstStyle/>
+          <a:p>
+            <a:r>
+              <a:rPr lang="en-US" smtClean="0"/>
+              <a:t>9/11/2013, 9/16/2013</a:t>
+            </a:r>
+            <a:endParaRPr lang="en-US" dirty="0"/>
+          </a:p>
+        </p:txBody>
+      </p:sp>
+      <p:sp>
+        <p:nvSpPr>
+          <p:cNvPr id="10" name="Footer Placeholder 6"/>
+          <p:cNvSpPr>
+            <a:spLocks noGrp="1"/>
+          </p:cNvSpPr>
+          <p:nvPr>
+            <p:ph type="ftr" sz="quarter" idx="11"/>
+          </p:nvPr>
+        </p:nvSpPr>
+        <p:spPr>
+          <a:xfrm>
+            <a:off x="1752600" y="8305800"/>
+            <a:ext cx="3352800" cy="609600"/>
+          </a:xfrm>
+        </p:spPr>
+        <p:txBody>
+          <a:bodyPr/>
+          <a:lstStyle/>
+          <a:p>
+            <a:r>
+              <a:rPr lang="en-US" smtClean="0"/>
+              <a:t>Professor Dong Washington University, St. Louis, MO</a:t>
+            </a:r>
+            <a:endParaRPr lang="en-US" dirty="0"/>
+          </a:p>
+        </p:txBody>
+      </p:sp>
+    </p:spTree>
+  </p:cSld>
+  <p:clrMapOvr>
+    <a:masterClrMapping/>
+  </p:clrMapOvr>
+  <p:timing>
+    <p:tnLst>
+      <p:par>
+        <p:cTn xmlns:p14="http://schemas.microsoft.com/office/powerpoint/2010/main" id="1" dur="indefinite" restart="never" nodeType="tmRoot"/>
+      </p:par>
+    </p:tnLst>
+  </p:timing>
+</p:sld>
+</file>
+
+<file path=ppt/slides/slide16.xml><?xml version="1.0" encoding="utf-8"?>
+<p:sld xmlns:a="http://schemas.openxmlformats.org/drawingml/2006/main" xmlns:r="http://schemas.openxmlformats.org/officeDocument/2006/relationships" xmlns:p="http://schemas.openxmlformats.org/presentationml/2006/main">
+  <p:cSld>
+    <p:spTree>
+      <p:nvGrpSpPr>
+        <p:cNvPr id="1" name=""/>
+        <p:cNvGrpSpPr/>
+        <p:nvPr/>
+      </p:nvGrpSpPr>
+      <p:grpSpPr>
+        <a:xfrm>
+          <a:off x="0" y="0"/>
+          <a:ext cx="0" cy="0"/>
+          <a:chOff x="0" y="0"/>
+          <a:chExt cx="0" cy="0"/>
+        </a:xfrm>
+      </p:grpSpPr>
+      <p:sp>
+        <p:nvSpPr>
+          <p:cNvPr id="2" name="Title 1"/>
+          <p:cNvSpPr>
+            <a:spLocks noGrp="1"/>
+          </p:cNvSpPr>
+          <p:nvPr>
+            <p:ph type="title"/>
+          </p:nvPr>
+        </p:nvSpPr>
+        <p:spPr/>
+        <p:txBody>
+          <a:bodyPr/>
+          <a:lstStyle/>
+          <a:p>
+            <a:r>
+              <a:rPr lang="en-US" dirty="0" smtClean="0"/>
               <a:t>Analysis</a:t>
             </a:r>
             <a:endParaRPr lang="en-US" dirty="0"/>
@@ -9756,7 +10466,7 @@
                 <a:latin typeface="Century Gothic" pitchFamily="34" charset="0"/>
               </a:rPr>
               <a:pPr/>
-              <a:t>15</a:t>
+              <a:t>16</a:t>
             </a:fld>
             <a:endParaRPr lang="en-US" dirty="0">
               <a:latin typeface="Century Gothic" pitchFamily="34" charset="0"/>
@@ -10668,7 +11378,7 @@
 </p:sld>
 </file>
 
-<file path=ppt/slides/slide16.xml><?xml version="1.0" encoding="utf-8"?>
+<file path=ppt/slides/slide17.xml><?xml version="1.0" encoding="utf-8"?>
 <p:sld xmlns:a="http://schemas.openxmlformats.org/drawingml/2006/main" xmlns:r="http://schemas.openxmlformats.org/officeDocument/2006/relationships" xmlns:p="http://schemas.openxmlformats.org/presentationml/2006/main">
   <p:cSld>
     <p:spTree>
@@ -10806,7 +11516,7 @@
                 <a:latin typeface="Century Gothic" pitchFamily="34" charset="0"/>
               </a:rPr>
               <a:pPr/>
-              <a:t>16</a:t>
+              <a:t>17</a:t>
             </a:fld>
             <a:endParaRPr lang="en-US" dirty="0">
               <a:latin typeface="Century Gothic" pitchFamily="34" charset="0"/>
@@ -10900,7 +11610,7 @@
 </p:sld>
 </file>
 
-<file path=ppt/slides/slide17.xml><?xml version="1.0" encoding="utf-8"?>
+<file path=ppt/slides/slide18.xml><?xml version="1.0" encoding="utf-8"?>
 <p:sld xmlns:a="http://schemas.openxmlformats.org/drawingml/2006/main" xmlns:r="http://schemas.openxmlformats.org/officeDocument/2006/relationships" xmlns:p="http://schemas.openxmlformats.org/presentationml/2006/main">
   <p:cSld>
     <p:spTree>
@@ -10986,7 +11696,7 @@
                 <a:latin typeface="Century Gothic" pitchFamily="34" charset="0"/>
               </a:rPr>
               <a:pPr/>
-              <a:t>17</a:t>
+              <a:t>18</a:t>
             </a:fld>
             <a:endParaRPr lang="en-US" dirty="0">
               <a:latin typeface="Century Gothic" pitchFamily="34" charset="0"/>
@@ -11021,287 +11731,6 @@
       <p:sp>
         <p:nvSpPr>
           <p:cNvPr id="6" name="Footer Placeholder 5"/>
-          <p:cNvSpPr>
-            <a:spLocks noGrp="1"/>
-          </p:cNvSpPr>
-          <p:nvPr>
-            <p:ph type="ftr" sz="quarter" idx="11"/>
-          </p:nvPr>
-        </p:nvSpPr>
-        <p:spPr/>
-        <p:txBody>
-          <a:bodyPr/>
-          <a:lstStyle/>
-          <a:p>
-            <a:r>
-              <a:rPr lang="en-US" smtClean="0"/>
-              <a:t>Professor Dong Washington University, St. Louis, MO</a:t>
-            </a:r>
-            <a:endParaRPr lang="en-US" dirty="0"/>
-          </a:p>
-        </p:txBody>
-      </p:sp>
-    </p:spTree>
-  </p:cSld>
-  <p:clrMapOvr>
-    <a:masterClrMapping/>
-  </p:clrMapOvr>
-  <p:timing>
-    <p:tnLst>
-      <p:par>
-        <p:cTn xmlns:p14="http://schemas.microsoft.com/office/powerpoint/2010/main" id="1" dur="indefinite" restart="never" nodeType="tmRoot"/>
-      </p:par>
-    </p:tnLst>
-  </p:timing>
-</p:sld>
-</file>
-
-<file path=ppt/slides/slide18.xml><?xml version="1.0" encoding="utf-8"?>
-<p:sld xmlns:a="http://schemas.openxmlformats.org/drawingml/2006/main" xmlns:r="http://schemas.openxmlformats.org/officeDocument/2006/relationships" xmlns:p="http://schemas.openxmlformats.org/presentationml/2006/main">
-  <p:cSld>
-    <p:spTree>
-      <p:nvGrpSpPr>
-        <p:cNvPr id="1" name=""/>
-        <p:cNvGrpSpPr/>
-        <p:nvPr/>
-      </p:nvGrpSpPr>
-      <p:grpSpPr>
-        <a:xfrm>
-          <a:off x="0" y="0"/>
-          <a:ext cx="0" cy="0"/>
-          <a:chOff x="0" y="0"/>
-          <a:chExt cx="0" cy="0"/>
-        </a:xfrm>
-      </p:grpSpPr>
-      <p:sp>
-        <p:nvSpPr>
-          <p:cNvPr id="2" name="Title 1"/>
-          <p:cNvSpPr>
-            <a:spLocks noGrp="1"/>
-          </p:cNvSpPr>
-          <p:nvPr>
-            <p:ph type="title"/>
-          </p:nvPr>
-        </p:nvSpPr>
-        <p:spPr>
-          <a:xfrm>
-            <a:off x="1219200" y="304800"/>
-            <a:ext cx="5829300" cy="1524000"/>
-          </a:xfrm>
-        </p:spPr>
-        <p:txBody>
-          <a:bodyPr/>
-          <a:lstStyle/>
-          <a:p>
-            <a:r>
-              <a:rPr lang="en-US" dirty="0" smtClean="0"/>
-              <a:t>Multiple Diseconomies of Scale</a:t>
-            </a:r>
-            <a:endParaRPr lang="en-US" dirty="0"/>
-          </a:p>
-        </p:txBody>
-      </p:sp>
-      <p:sp>
-        <p:nvSpPr>
-          <p:cNvPr id="3" name="Content Placeholder 2"/>
-          <p:cNvSpPr>
-            <a:spLocks noGrp="1"/>
-          </p:cNvSpPr>
-          <p:nvPr>
-            <p:ph idx="1"/>
-          </p:nvPr>
-        </p:nvSpPr>
-        <p:spPr/>
-        <p:txBody>
-          <a:bodyPr/>
-          <a:lstStyle/>
-          <a:p>
-            <a:endParaRPr lang="en-US" dirty="0" smtClean="0"/>
-          </a:p>
-          <a:p>
-            <a:endParaRPr lang="en-US" dirty="0" smtClean="0"/>
-          </a:p>
-          <a:p>
-            <a:endParaRPr lang="en-US" dirty="0" smtClean="0"/>
-          </a:p>
-          <a:p>
-            <a:endParaRPr lang="en-US" dirty="0" smtClean="0"/>
-          </a:p>
-          <a:p>
-            <a:endParaRPr lang="en-US" dirty="0" smtClean="0"/>
-          </a:p>
-          <a:p>
-            <a:pPr>
-              <a:buNone/>
-            </a:pPr>
-            <a:endParaRPr lang="en-US" dirty="0"/>
-          </a:p>
-        </p:txBody>
-      </p:sp>
-      <p:sp>
-        <p:nvSpPr>
-          <p:cNvPr id="4" name="Date Placeholder 3"/>
-          <p:cNvSpPr>
-            <a:spLocks noGrp="1"/>
-          </p:cNvSpPr>
-          <p:nvPr>
-            <p:ph type="dt" sz="half" idx="10"/>
-          </p:nvPr>
-        </p:nvSpPr>
-        <p:spPr/>
-        <p:txBody>
-          <a:bodyPr/>
-          <a:lstStyle/>
-          <a:p>
-            <a:r>
-              <a:rPr lang="en-US" smtClean="0"/>
-              <a:t>9/11/2013, 9/16/2013</a:t>
-            </a:r>
-            <a:endParaRPr lang="en-US" dirty="0"/>
-          </a:p>
-        </p:txBody>
-      </p:sp>
-      <p:sp>
-        <p:nvSpPr>
-          <p:cNvPr id="5" name="Slide Number Placeholder 4"/>
-          <p:cNvSpPr>
-            <a:spLocks noGrp="1"/>
-          </p:cNvSpPr>
-          <p:nvPr>
-            <p:ph type="sldNum" sz="quarter" idx="12"/>
-          </p:nvPr>
-        </p:nvSpPr>
-        <p:spPr/>
-        <p:txBody>
-          <a:bodyPr/>
-          <a:lstStyle/>
-          <a:p>
-            <a:endParaRPr lang="en-US" dirty="0" smtClean="0"/>
-          </a:p>
-          <a:p>
-            <a:fld id="{A49A29FA-4273-4644-9824-20CC8B708BD3}" type="slidenum">
-              <a:rPr lang="en-US" smtClean="0">
-                <a:latin typeface="Century Gothic" pitchFamily="34" charset="0"/>
-              </a:rPr>
-              <a:pPr/>
-              <a:t>18</a:t>
-            </a:fld>
-            <a:endParaRPr lang="en-US" dirty="0">
-              <a:latin typeface="Century Gothic" pitchFamily="34" charset="0"/>
-            </a:endParaRPr>
-          </a:p>
-        </p:txBody>
-      </p:sp>
-      <p:graphicFrame>
-        <p:nvGraphicFramePr>
-          <p:cNvPr id="6" name="Chart 5"/>
-          <p:cNvGraphicFramePr/>
-          <p:nvPr/>
-        </p:nvGraphicFramePr>
-        <p:xfrm>
-          <a:off x="1143000" y="3581400"/>
-          <a:ext cx="4572000" cy="2743200"/>
-        </p:xfrm>
-        <a:graphic>
-          <a:graphicData uri="http://schemas.openxmlformats.org/drawingml/2006/chart">
-            <c:chart xmlns:c="http://schemas.openxmlformats.org/drawingml/2006/chart" xmlns:r="http://schemas.openxmlformats.org/officeDocument/2006/relationships" r:id="rId2"/>
-          </a:graphicData>
-        </a:graphic>
-      </p:graphicFrame>
-      <p:sp>
-        <p:nvSpPr>
-          <p:cNvPr id="8" name="TextBox 7"/>
-          <p:cNvSpPr txBox="1"/>
-          <p:nvPr/>
-        </p:nvSpPr>
-        <p:spPr>
-          <a:xfrm>
-            <a:off x="914400" y="2209800"/>
-            <a:ext cx="5181600" cy="1200329"/>
-          </a:xfrm>
-          <a:prstGeom prst="rect">
-            <a:avLst/>
-          </a:prstGeom>
-          <a:noFill/>
-        </p:spPr>
-        <p:txBody>
-          <a:bodyPr wrap="square" rtlCol="0">
-            <a:spAutoFit/>
-          </a:bodyPr>
-          <a:lstStyle/>
-          <a:p>
-            <a:pPr algn="l"/>
-            <a:r>
-              <a:rPr lang="en-US" dirty="0" smtClean="0">
-                <a:latin typeface="Century Gothic"/>
-                <a:cs typeface="Century Gothic"/>
-              </a:rPr>
-              <a:t>The following figure displays a different profit function that exhibits decreasing marginal return.</a:t>
-            </a:r>
-          </a:p>
-          <a:p>
-            <a:pPr algn="l"/>
-            <a:endParaRPr lang="en-US" dirty="0"/>
-          </a:p>
-        </p:txBody>
-      </p:sp>
-      <p:sp>
-        <p:nvSpPr>
-          <p:cNvPr id="9" name="TextBox 8"/>
-          <p:cNvSpPr txBox="1"/>
-          <p:nvPr/>
-        </p:nvSpPr>
-        <p:spPr>
-          <a:xfrm>
-            <a:off x="990600" y="6858000"/>
-            <a:ext cx="5181600" cy="1200329"/>
-          </a:xfrm>
-          <a:prstGeom prst="rect">
-            <a:avLst/>
-          </a:prstGeom>
-          <a:noFill/>
-        </p:spPr>
-        <p:txBody>
-          <a:bodyPr wrap="square" rtlCol="0">
-            <a:spAutoFit/>
-          </a:bodyPr>
-          <a:lstStyle/>
-          <a:p>
-            <a:pPr algn="l"/>
-            <a:r>
-              <a:rPr lang="en-US" dirty="0" smtClean="0">
-                <a:latin typeface="Century Gothic"/>
-                <a:cs typeface="Century Gothic"/>
-              </a:rPr>
-              <a:t>The analog of the approach we just employed works here as well. </a:t>
-            </a:r>
-          </a:p>
-          <a:p>
-            <a:pPr algn="l"/>
-            <a:endParaRPr lang="en-US" dirty="0" smtClean="0">
-              <a:latin typeface="Century Gothic"/>
-              <a:cs typeface="Century Gothic"/>
-            </a:endParaRPr>
-          </a:p>
-          <a:p>
-            <a:pPr algn="l"/>
-            <a:r>
-              <a:rPr lang="en-US" dirty="0" smtClean="0">
-                <a:latin typeface="Century Gothic"/>
-                <a:cs typeface="Century Gothic"/>
-              </a:rPr>
-              <a:t>This leads to the following result. </a:t>
-            </a:r>
-            <a:endParaRPr lang="en-US" dirty="0">
-              <a:latin typeface="Century Gothic"/>
-              <a:cs typeface="Century Gothic"/>
-            </a:endParaRPr>
-          </a:p>
-        </p:txBody>
-      </p:sp>
-      <p:sp>
-        <p:nvSpPr>
-          <p:cNvPr id="10" name="Footer Placeholder 9"/>
           <p:cNvSpPr>
             <a:spLocks noGrp="1"/>
           </p:cNvSpPr>
@@ -11366,7 +11795,7 @@
         </p:nvSpPr>
         <p:spPr>
           <a:xfrm>
-            <a:off x="1295400" y="304800"/>
+            <a:off x="1219200" y="304800"/>
             <a:ext cx="5829300" cy="1524000"/>
           </a:xfrm>
         </p:spPr>
@@ -11376,7 +11805,7 @@
           <a:p>
             <a:r>
               <a:rPr lang="en-US" dirty="0" smtClean="0"/>
-              <a:t>Multiple Diseconomies of Scale </a:t>
+              <a:t>Multiple Diseconomies of Scale</a:t>
             </a:r>
             <a:endParaRPr lang="en-US" dirty="0"/>
           </a:p>
@@ -11392,57 +11821,30 @@
             <p:ph idx="1"/>
           </p:nvPr>
         </p:nvSpPr>
-        <p:spPr>
-          <a:xfrm>
-            <a:off x="533400" y="1905000"/>
-            <a:ext cx="5829300" cy="2057400"/>
-          </a:xfrm>
-          <a:effectLst>
-            <a:outerShdw blurRad="50800" dist="38100" dir="2700000" algn="tl" rotWithShape="0">
-              <a:prstClr val="black">
-                <a:alpha val="40000"/>
-              </a:prstClr>
-            </a:outerShdw>
-          </a:effectLst>
-        </p:spPr>
-        <p:style>
-          <a:lnRef idx="1">
-            <a:schemeClr val="accent3"/>
-          </a:lnRef>
-          <a:fillRef idx="2">
-            <a:schemeClr val="accent3"/>
-          </a:fillRef>
-          <a:effectRef idx="1">
-            <a:schemeClr val="accent3"/>
-          </a:effectRef>
-          <a:fontRef idx="minor">
-            <a:schemeClr val="dk1"/>
-          </a:fontRef>
-        </p:style>
+        <p:spPr/>
         <p:txBody>
           <a:bodyPr/>
           <a:lstStyle/>
+          <a:p>
+            <a:endParaRPr lang="en-US" dirty="0" smtClean="0"/>
+          </a:p>
+          <a:p>
+            <a:endParaRPr lang="en-US" dirty="0" smtClean="0"/>
+          </a:p>
+          <a:p>
+            <a:endParaRPr lang="en-US" dirty="0" smtClean="0"/>
+          </a:p>
+          <a:p>
+            <a:endParaRPr lang="en-US" dirty="0" smtClean="0"/>
+          </a:p>
+          <a:p>
+            <a:endParaRPr lang="en-US" dirty="0" smtClean="0"/>
+          </a:p>
           <a:p>
             <a:pPr>
               <a:buNone/>
             </a:pPr>
-            <a:endParaRPr lang="en-US" b="1" dirty="0" smtClean="0">
-              <a:latin typeface="Century Gothic" pitchFamily="34" charset="0"/>
-            </a:endParaRPr>
-          </a:p>
-          <a:p>
-            <a:pPr>
-              <a:buNone/>
-            </a:pPr>
-            <a:r>
-              <a:rPr lang="en-US" b="1" dirty="0" smtClean="0">
-                <a:latin typeface="Century Gothic" pitchFamily="34" charset="0"/>
-              </a:rPr>
-              <a:t>     A linear program readily accommodates decreasing marginal return, increasing marginal cost, and other diseconomies of scale. </a:t>
-            </a:r>
-            <a:endParaRPr lang="en-US" b="1" dirty="0">
-              <a:latin typeface="Century Gothic" pitchFamily="34" charset="0"/>
-            </a:endParaRPr>
+            <a:endParaRPr lang="en-US" dirty="0"/>
           </a:p>
         </p:txBody>
       </p:sp>
@@ -11500,16 +11902,32 @@
           </a:p>
         </p:txBody>
       </p:sp>
-      <p:sp>
-        <p:nvSpPr>
-          <p:cNvPr id="6" name="TextBox 5"/>
+      <p:graphicFrame>
+        <p:nvGraphicFramePr>
+          <p:cNvPr id="6" name="Chart 5"/>
+          <p:cNvGraphicFramePr/>
+          <p:nvPr/>
+        </p:nvGraphicFramePr>
+        <p:xfrm>
+          <a:off x="1143000" y="3581400"/>
+          <a:ext cx="4572000" cy="2743200"/>
+        </p:xfrm>
+        <a:graphic>
+          <a:graphicData uri="http://schemas.openxmlformats.org/drawingml/2006/chart">
+            <c:chart xmlns:c="http://schemas.openxmlformats.org/drawingml/2006/chart" xmlns:r="http://schemas.openxmlformats.org/officeDocument/2006/relationships" r:id="rId2"/>
+          </a:graphicData>
+        </a:graphic>
+      </p:graphicFrame>
+      <p:sp>
+        <p:nvSpPr>
+          <p:cNvPr id="8" name="TextBox 7"/>
           <p:cNvSpPr txBox="1"/>
           <p:nvPr/>
         </p:nvSpPr>
         <p:spPr>
           <a:xfrm>
-            <a:off x="609600" y="4572000"/>
-            <a:ext cx="5562600" cy="1754326"/>
+            <a:off x="914400" y="2209800"/>
+            <a:ext cx="5181600" cy="1200329"/>
           </a:xfrm>
           <a:prstGeom prst="rect">
             <a:avLst/>
@@ -11524,11 +11942,48 @@
           <a:p>
             <a:pPr algn="l"/>
             <a:r>
-              <a:rPr lang="en-US" b="1" dirty="0" smtClean="0">
+              <a:rPr lang="en-US" dirty="0" smtClean="0">
                 <a:latin typeface="Century Gothic"/>
                 <a:cs typeface="Century Gothic"/>
               </a:rPr>
-              <a:t>Summary</a:t>
+              <a:t>The following figure displays a different profit function that exhibits decreasing marginal return.</a:t>
+            </a:r>
+          </a:p>
+          <a:p>
+            <a:pPr algn="l"/>
+            <a:endParaRPr lang="en-US" dirty="0"/>
+          </a:p>
+        </p:txBody>
+      </p:sp>
+      <p:sp>
+        <p:nvSpPr>
+          <p:cNvPr id="9" name="TextBox 8"/>
+          <p:cNvSpPr txBox="1"/>
+          <p:nvPr/>
+        </p:nvSpPr>
+        <p:spPr>
+          <a:xfrm>
+            <a:off x="990600" y="6858000"/>
+            <a:ext cx="5181600" cy="1200329"/>
+          </a:xfrm>
+          <a:prstGeom prst="rect">
+            <a:avLst/>
+          </a:prstGeom>
+          <a:noFill/>
+        </p:spPr>
+        <p:txBody>
+          <a:bodyPr wrap="square" rtlCol="0">
+            <a:spAutoFit/>
+          </a:bodyPr>
+          <a:lstStyle/>
+          <a:p>
+            <a:pPr algn="l"/>
+            <a:r>
+              <a:rPr lang="en-US" dirty="0" smtClean="0">
+                <a:latin typeface="Century Gothic"/>
+                <a:cs typeface="Century Gothic"/>
+              </a:rPr>
+              <a:t>The analog of the approach we just employed works here as well. </a:t>
             </a:r>
           </a:p>
           <a:p>
@@ -11539,47 +11994,15 @@
             </a:endParaRPr>
           </a:p>
           <a:p>
-            <a:pPr marL="342900" indent="-342900" algn="l">
-              <a:buFont typeface="+mj-lt"/>
-              <a:buAutoNum type="arabicPeriod"/>
-            </a:pPr>
+            <a:pPr algn="l"/>
             <a:r>
               <a:rPr lang="en-US" dirty="0" smtClean="0">
                 <a:latin typeface="Century Gothic"/>
                 <a:cs typeface="Century Gothic"/>
               </a:rPr>
-              <a:t>Intuition behind the Simplex algorithm</a:t>
-            </a:r>
-          </a:p>
-          <a:p>
-            <a:pPr marL="342900" indent="-342900" algn="l">
-              <a:buFont typeface="+mj-lt"/>
-              <a:buAutoNum type="arabicPeriod"/>
-            </a:pPr>
-            <a:r>
-              <a:rPr lang="en-US" dirty="0" smtClean="0">
-                <a:latin typeface="Century Gothic"/>
-                <a:cs typeface="Century Gothic"/>
-              </a:rPr>
-              <a:t>Additional LP formulations</a:t>
-            </a:r>
-          </a:p>
-          <a:p>
-            <a:pPr marL="342900" indent="-342900" algn="l">
-              <a:buFont typeface="+mj-lt"/>
-              <a:buAutoNum type="arabicPeriod"/>
-            </a:pPr>
-            <a:r>
-              <a:rPr lang="en-US" dirty="0" smtClean="0">
-                <a:latin typeface="Century Gothic"/>
-                <a:cs typeface="Century Gothic"/>
-              </a:rPr>
-              <a:t>Accommodations of piece-wise linearity</a:t>
-            </a:r>
-          </a:p>
-          <a:p>
-            <a:pPr marL="342900" indent="-342900" algn="l"/>
-            <a:endParaRPr lang="en-US" dirty="0" smtClean="0">
+              <a:t>This leads to the following result. </a:t>
+            </a:r>
+            <a:endParaRPr lang="en-US" dirty="0">
               <a:latin typeface="Century Gothic"/>
               <a:cs typeface="Century Gothic"/>
             </a:endParaRPr>
@@ -11588,7 +12011,7 @@
       </p:sp>
       <p:sp>
         <p:nvSpPr>
-          <p:cNvPr id="7" name="Footer Placeholder 6"/>
+          <p:cNvPr id="10" name="Footer Placeholder 9"/>
           <p:cNvSpPr>
             <a:spLocks noGrp="1"/>
           </p:cNvSpPr>
@@ -11841,6 +12264,293 @@
               <a:t>Bonus: How do I incorporate the penalty in the objective? (Hint: introduce a set of new decision variables that keep track of how much is shipped to each city)</a:t>
             </a:r>
             <a:endParaRPr lang="en-US" b="1" dirty="0"/>
+          </a:p>
+        </p:txBody>
+      </p:sp>
+    </p:spTree>
+  </p:cSld>
+  <p:clrMapOvr>
+    <a:masterClrMapping/>
+  </p:clrMapOvr>
+  <p:timing>
+    <p:tnLst>
+      <p:par>
+        <p:cTn xmlns:p14="http://schemas.microsoft.com/office/powerpoint/2010/main" id="1" dur="indefinite" restart="never" nodeType="tmRoot"/>
+      </p:par>
+    </p:tnLst>
+  </p:timing>
+</p:sld>
+</file>
+
+<file path=ppt/slides/slide20.xml><?xml version="1.0" encoding="utf-8"?>
+<p:sld xmlns:a="http://schemas.openxmlformats.org/drawingml/2006/main" xmlns:r="http://schemas.openxmlformats.org/officeDocument/2006/relationships" xmlns:p="http://schemas.openxmlformats.org/presentationml/2006/main">
+  <p:cSld>
+    <p:spTree>
+      <p:nvGrpSpPr>
+        <p:cNvPr id="1" name=""/>
+        <p:cNvGrpSpPr/>
+        <p:nvPr/>
+      </p:nvGrpSpPr>
+      <p:grpSpPr>
+        <a:xfrm>
+          <a:off x="0" y="0"/>
+          <a:ext cx="0" cy="0"/>
+          <a:chOff x="0" y="0"/>
+          <a:chExt cx="0" cy="0"/>
+        </a:xfrm>
+      </p:grpSpPr>
+      <p:sp>
+        <p:nvSpPr>
+          <p:cNvPr id="2" name="Title 1"/>
+          <p:cNvSpPr>
+            <a:spLocks noGrp="1"/>
+          </p:cNvSpPr>
+          <p:nvPr>
+            <p:ph type="title"/>
+          </p:nvPr>
+        </p:nvSpPr>
+        <p:spPr>
+          <a:xfrm>
+            <a:off x="1295400" y="304800"/>
+            <a:ext cx="5829300" cy="1524000"/>
+          </a:xfrm>
+        </p:spPr>
+        <p:txBody>
+          <a:bodyPr/>
+          <a:lstStyle/>
+          <a:p>
+            <a:r>
+              <a:rPr lang="en-US" dirty="0" smtClean="0"/>
+              <a:t>Multiple Diseconomies of Scale </a:t>
+            </a:r>
+            <a:endParaRPr lang="en-US" dirty="0"/>
+          </a:p>
+        </p:txBody>
+      </p:sp>
+      <p:sp>
+        <p:nvSpPr>
+          <p:cNvPr id="3" name="Content Placeholder 2"/>
+          <p:cNvSpPr>
+            <a:spLocks noGrp="1"/>
+          </p:cNvSpPr>
+          <p:nvPr>
+            <p:ph idx="1"/>
+          </p:nvPr>
+        </p:nvSpPr>
+        <p:spPr>
+          <a:xfrm>
+            <a:off x="533400" y="1905000"/>
+            <a:ext cx="5829300" cy="2057400"/>
+          </a:xfrm>
+          <a:effectLst>
+            <a:outerShdw blurRad="50800" dist="38100" dir="2700000" algn="tl" rotWithShape="0">
+              <a:prstClr val="black">
+                <a:alpha val="40000"/>
+              </a:prstClr>
+            </a:outerShdw>
+          </a:effectLst>
+        </p:spPr>
+        <p:style>
+          <a:lnRef idx="1">
+            <a:schemeClr val="accent3"/>
+          </a:lnRef>
+          <a:fillRef idx="2">
+            <a:schemeClr val="accent3"/>
+          </a:fillRef>
+          <a:effectRef idx="1">
+            <a:schemeClr val="accent3"/>
+          </a:effectRef>
+          <a:fontRef idx="minor">
+            <a:schemeClr val="dk1"/>
+          </a:fontRef>
+        </p:style>
+        <p:txBody>
+          <a:bodyPr/>
+          <a:lstStyle/>
+          <a:p>
+            <a:pPr>
+              <a:buNone/>
+            </a:pPr>
+            <a:endParaRPr lang="en-US" b="1" dirty="0" smtClean="0">
+              <a:latin typeface="Century Gothic" pitchFamily="34" charset="0"/>
+            </a:endParaRPr>
+          </a:p>
+          <a:p>
+            <a:pPr>
+              <a:buNone/>
+            </a:pPr>
+            <a:r>
+              <a:rPr lang="en-US" b="1" dirty="0" smtClean="0">
+                <a:latin typeface="Century Gothic" pitchFamily="34" charset="0"/>
+              </a:rPr>
+              <a:t>     A linear program readily accommodates decreasing marginal return, increasing marginal cost, and other diseconomies of scale. </a:t>
+            </a:r>
+            <a:endParaRPr lang="en-US" b="1" dirty="0">
+              <a:latin typeface="Century Gothic" pitchFamily="34" charset="0"/>
+            </a:endParaRPr>
+          </a:p>
+        </p:txBody>
+      </p:sp>
+      <p:sp>
+        <p:nvSpPr>
+          <p:cNvPr id="4" name="Date Placeholder 3"/>
+          <p:cNvSpPr>
+            <a:spLocks noGrp="1"/>
+          </p:cNvSpPr>
+          <p:nvPr>
+            <p:ph type="dt" sz="half" idx="10"/>
+          </p:nvPr>
+        </p:nvSpPr>
+        <p:spPr/>
+        <p:txBody>
+          <a:bodyPr/>
+          <a:lstStyle/>
+          <a:p>
+            <a:r>
+              <a:rPr lang="en-US" smtClean="0"/>
+              <a:t>9/11/2013, 9/16/2013</a:t>
+            </a:r>
+            <a:endParaRPr lang="en-US" dirty="0"/>
+          </a:p>
+        </p:txBody>
+      </p:sp>
+      <p:sp>
+        <p:nvSpPr>
+          <p:cNvPr id="5" name="Slide Number Placeholder 4"/>
+          <p:cNvSpPr>
+            <a:spLocks noGrp="1"/>
+          </p:cNvSpPr>
+          <p:nvPr>
+            <p:ph type="sldNum" sz="quarter" idx="12"/>
+          </p:nvPr>
+        </p:nvSpPr>
+        <p:spPr/>
+        <p:txBody>
+          <a:bodyPr/>
+          <a:lstStyle/>
+          <a:p>
+            <a:endParaRPr lang="en-US" dirty="0" smtClean="0"/>
+          </a:p>
+          <a:p>
+            <a:fld id="{A49A29FA-4273-4644-9824-20CC8B708BD3}" type="slidenum">
+              <a:rPr lang="en-US" smtClean="0">
+                <a:latin typeface="Century Gothic" pitchFamily="34" charset="0"/>
+              </a:rPr>
+              <a:pPr/>
+              <a:t>20</a:t>
+            </a:fld>
+            <a:endParaRPr lang="en-US" dirty="0">
+              <a:latin typeface="Century Gothic" pitchFamily="34" charset="0"/>
+            </a:endParaRPr>
+          </a:p>
+        </p:txBody>
+      </p:sp>
+      <p:sp>
+        <p:nvSpPr>
+          <p:cNvPr id="6" name="TextBox 5"/>
+          <p:cNvSpPr txBox="1"/>
+          <p:nvPr/>
+        </p:nvSpPr>
+        <p:spPr>
+          <a:xfrm>
+            <a:off x="609600" y="4572000"/>
+            <a:ext cx="5562600" cy="1754326"/>
+          </a:xfrm>
+          <a:prstGeom prst="rect">
+            <a:avLst/>
+          </a:prstGeom>
+          <a:noFill/>
+        </p:spPr>
+        <p:txBody>
+          <a:bodyPr wrap="square" rtlCol="0">
+            <a:spAutoFit/>
+          </a:bodyPr>
+          <a:lstStyle/>
+          <a:p>
+            <a:pPr algn="l"/>
+            <a:r>
+              <a:rPr lang="en-US" b="1" dirty="0" smtClean="0">
+                <a:latin typeface="Century Gothic"/>
+                <a:cs typeface="Century Gothic"/>
+              </a:rPr>
+              <a:t>Summary</a:t>
+            </a:r>
+          </a:p>
+          <a:p>
+            <a:pPr algn="l"/>
+            <a:endParaRPr lang="en-US" dirty="0" smtClean="0">
+              <a:latin typeface="Century Gothic"/>
+              <a:cs typeface="Century Gothic"/>
+            </a:endParaRPr>
+          </a:p>
+          <a:p>
+            <a:pPr marL="342900" indent="-342900" algn="l">
+              <a:buFont typeface="+mj-lt"/>
+              <a:buAutoNum type="arabicPeriod"/>
+            </a:pPr>
+            <a:r>
+              <a:rPr lang="en-US" dirty="0" smtClean="0">
+                <a:latin typeface="Century Gothic"/>
+                <a:cs typeface="Century Gothic"/>
+              </a:rPr>
+              <a:t>Intuition behind the Simplex algorithm</a:t>
+            </a:r>
+          </a:p>
+          <a:p>
+            <a:pPr marL="342900" indent="-342900" algn="l">
+              <a:buFont typeface="+mj-lt"/>
+              <a:buAutoNum type="arabicPeriod"/>
+            </a:pPr>
+            <a:r>
+              <a:rPr lang="en-US" dirty="0" smtClean="0">
+                <a:latin typeface="Century Gothic"/>
+                <a:cs typeface="Century Gothic"/>
+              </a:rPr>
+              <a:t>Additional LP formulations</a:t>
+            </a:r>
+          </a:p>
+          <a:p>
+            <a:pPr marL="342900" indent="-342900" algn="l">
+              <a:buFont typeface="+mj-lt"/>
+              <a:buAutoNum type="arabicPeriod"/>
+            </a:pPr>
+            <a:r>
+              <a:rPr lang="en-US" dirty="0" smtClean="0">
+                <a:latin typeface="Century Gothic"/>
+                <a:cs typeface="Century Gothic"/>
+              </a:rPr>
+              <a:t>Accommodations of piece-wise linearity</a:t>
+            </a:r>
+          </a:p>
+          <a:p>
+            <a:pPr marL="342900" indent="-342900" algn="l"/>
+            <a:endParaRPr lang="en-US" dirty="0" smtClean="0">
+              <a:latin typeface="Century Gothic"/>
+              <a:cs typeface="Century Gothic"/>
+            </a:endParaRPr>
+          </a:p>
+        </p:txBody>
+      </p:sp>
+      <p:sp>
+        <p:nvSpPr>
+          <p:cNvPr id="7" name="Footer Placeholder 6"/>
+          <p:cNvSpPr>
+            <a:spLocks noGrp="1"/>
+          </p:cNvSpPr>
+          <p:nvPr>
+            <p:ph type="ftr" sz="quarter" idx="11"/>
+          </p:nvPr>
+        </p:nvSpPr>
+        <p:spPr/>
+        <p:txBody>
+          <a:bodyPr/>
+          <a:lstStyle/>
+          <a:p>
+            <a:r>
+              <a:rPr lang="en-US" smtClean="0"/>
+              <a:t>Professor Dong Washington University, St. Louis, MO</a:t>
+            </a:r>
+            <a:endParaRPr lang="en-US" dirty="0"/>
           </a:p>
         </p:txBody>
       </p:sp>
@@ -14645,6 +15355,312 @@
       </p:grpSpPr>
       <p:sp>
         <p:nvSpPr>
+          <p:cNvPr id="18435" name="Slide Number Placeholder 5"/>
+          <p:cNvSpPr>
+            <a:spLocks noGrp="1"/>
+          </p:cNvSpPr>
+          <p:nvPr>
+            <p:ph type="sldNum" sz="quarter" idx="11"/>
+          </p:nvPr>
+        </p:nvSpPr>
+        <p:spPr>
+          <a:noFill/>
+        </p:spPr>
+        <p:txBody>
+          <a:bodyPr/>
+          <a:lstStyle/>
+          <a:p>
+            <a:endParaRPr lang="en-US">
+              <a:latin typeface="Century Gothic" charset="0"/>
+            </a:endParaRPr>
+          </a:p>
+          <a:p>
+            <a:fld id="{8FF66E9F-49CE-FD47-A5EE-A2AEE5BFAC54}" type="slidenum">
+              <a:rPr lang="en-US">
+                <a:latin typeface="Century Gothic" charset="0"/>
+              </a:rPr>
+              <a:pPr/>
+              <a:t>7</a:t>
+            </a:fld>
+            <a:endParaRPr lang="en-US">
+              <a:latin typeface="Century Gothic" charset="0"/>
+            </a:endParaRPr>
+          </a:p>
+        </p:txBody>
+      </p:sp>
+      <p:sp>
+        <p:nvSpPr>
+          <p:cNvPr id="18436" name="Rectangle 23"/>
+          <p:cNvSpPr>
+            <a:spLocks noGrp="1" noChangeArrowheads="1"/>
+          </p:cNvSpPr>
+          <p:nvPr>
+            <p:ph type="title"/>
+          </p:nvPr>
+        </p:nvSpPr>
+        <p:spPr/>
+        <p:txBody>
+          <a:bodyPr/>
+          <a:lstStyle/>
+          <a:p>
+            <a:r>
+              <a:rPr lang="en-US">
+                <a:latin typeface="Century Gothic" charset="0"/>
+              </a:rPr>
+              <a:t>Product Mix Example</a:t>
+            </a:r>
+          </a:p>
+        </p:txBody>
+      </p:sp>
+      <p:sp>
+        <p:nvSpPr>
+          <p:cNvPr id="18437" name="Rectangle 24"/>
+          <p:cNvSpPr>
+            <a:spLocks noGrp="1" noChangeArrowheads="1"/>
+          </p:cNvSpPr>
+          <p:nvPr>
+            <p:ph type="body" idx="1"/>
+          </p:nvPr>
+        </p:nvSpPr>
+        <p:spPr/>
+        <p:txBody>
+          <a:bodyPr/>
+          <a:lstStyle/>
+          <a:p>
+            <a:pPr>
+              <a:lnSpc>
+                <a:spcPct val="80000"/>
+              </a:lnSpc>
+              <a:buFontTx/>
+              <a:buNone/>
+            </a:pPr>
+            <a:r>
+              <a:rPr lang="en-US" dirty="0">
+                <a:latin typeface="Century Gothic" charset="0"/>
+              </a:rPr>
+              <a:t>Par, Inc. Problem</a:t>
+            </a:r>
+            <a:endParaRPr lang="en-US" sz="1800" dirty="0">
+              <a:latin typeface="Century Gothic" charset="0"/>
+            </a:endParaRPr>
+          </a:p>
+          <a:p>
+            <a:pPr algn="just">
+              <a:lnSpc>
+                <a:spcPct val="120000"/>
+              </a:lnSpc>
+              <a:buFontTx/>
+              <a:buNone/>
+            </a:pPr>
+            <a:r>
+              <a:rPr lang="en-US" sz="1600" dirty="0">
+                <a:latin typeface="Century Gothic" charset="0"/>
+              </a:rPr>
+              <a:t>	Par, Inc. manufactures two types of golf bags:  standard and deluxe. The profit contribution of a standard golf bag is $10. The profit contribution of a deluxe golf bag is $9. The production of golf bags mainly consists </a:t>
+            </a:r>
+            <a:r>
+              <a:rPr lang="en-US" sz="1600" dirty="0" smtClean="0">
+                <a:latin typeface="Century Gothic" charset="0"/>
+              </a:rPr>
+              <a:t>of four </a:t>
+            </a:r>
+            <a:r>
+              <a:rPr lang="en-US" sz="1600" dirty="0">
+                <a:latin typeface="Century Gothic" charset="0"/>
+              </a:rPr>
+              <a:t>steps: cutting &amp; dyeing, sewing, finishing, inspection &amp; packaging. Each standard golf bag requires 7/10 hours of </a:t>
+            </a:r>
+            <a:r>
+              <a:rPr lang="en-US" sz="1600" dirty="0" smtClean="0">
+                <a:latin typeface="Century Gothic" charset="0"/>
+              </a:rPr>
+              <a:t>cutting&amp; </a:t>
+            </a:r>
+            <a:r>
+              <a:rPr lang="en-US" sz="1600" dirty="0">
+                <a:latin typeface="Century Gothic" charset="0"/>
+              </a:rPr>
+              <a:t>dyeing, 1/2 hour of sewing, 1 hour of finishing, and 0.1 hour of inspection &amp; packaging. Each deluxe golf bag requires 1 hours of cutting</a:t>
+            </a:r>
+            <a:r>
+              <a:rPr lang="en-US" sz="1600" dirty="0" smtClean="0">
+                <a:latin typeface="Century Gothic" charset="0"/>
+              </a:rPr>
+              <a:t> &amp; dyeing</a:t>
+            </a:r>
+            <a:r>
+              <a:rPr lang="en-US" sz="1600" dirty="0">
+                <a:latin typeface="Century Gothic" charset="0"/>
+              </a:rPr>
+              <a:t>, 5/6 hour of sewing, 2/3 hour of finishing, and 1/4 hour of inspection &amp; packaging. Demand for golf bags is unlimited. However, due to the capacity and labor constraints, each week Par has at most 630 hours of cutting &amp; dyeing, 600 hours of sewing, 708 hours of finishing, and 135 hours of inspection and packaging for the production of golf bags. Par wishes to maximize weekly profit.  Formulate a mathematical model of Par's situation that can be used to maximize weekly profit.</a:t>
+            </a:r>
+          </a:p>
+          <a:p>
+            <a:pPr>
+              <a:lnSpc>
+                <a:spcPct val="80000"/>
+              </a:lnSpc>
+              <a:buFontTx/>
+              <a:buNone/>
+            </a:pPr>
+            <a:r>
+              <a:rPr lang="en-US" sz="1800" dirty="0">
+                <a:latin typeface="Century Gothic" charset="0"/>
+              </a:rPr>
+              <a:t>	</a:t>
+            </a:r>
+          </a:p>
+        </p:txBody>
+      </p:sp>
+      <p:pic>
+        <p:nvPicPr>
+          <p:cNvPr id="18438" name="Picture 25" descr="j0285736"/>
+          <p:cNvPicPr>
+            <a:picLocks noChangeAspect="1" noChangeArrowheads="1"/>
+          </p:cNvPicPr>
+          <p:nvPr/>
+        </p:nvPicPr>
+        <p:blipFill>
+          <a:blip r:embed="rId3" cstate="print"/>
+          <a:srcRect/>
+          <a:stretch>
+            <a:fillRect/>
+          </a:stretch>
+        </p:blipFill>
+        <p:spPr bwMode="auto">
+          <a:xfrm>
+            <a:off x="5867400" y="7545388"/>
+            <a:ext cx="963613" cy="989012"/>
+          </a:xfrm>
+          <a:prstGeom prst="rect">
+            <a:avLst/>
+          </a:prstGeom>
+          <a:noFill/>
+          <a:ln w="9525">
+            <a:noFill/>
+            <a:miter lim="800000"/>
+            <a:headEnd/>
+            <a:tailEnd/>
+          </a:ln>
+        </p:spPr>
+      </p:pic>
+      <p:pic>
+        <p:nvPicPr>
+          <p:cNvPr id="18439" name="Picture 26" descr="j0285738"/>
+          <p:cNvPicPr>
+            <a:picLocks noChangeAspect="1" noChangeArrowheads="1"/>
+          </p:cNvPicPr>
+          <p:nvPr/>
+        </p:nvPicPr>
+        <p:blipFill>
+          <a:blip r:embed="rId4" cstate="print"/>
+          <a:srcRect/>
+          <a:stretch>
+            <a:fillRect/>
+          </a:stretch>
+        </p:blipFill>
+        <p:spPr bwMode="auto">
+          <a:xfrm>
+            <a:off x="152400" y="7543800"/>
+            <a:ext cx="1011238" cy="1062038"/>
+          </a:xfrm>
+          <a:prstGeom prst="rect">
+            <a:avLst/>
+          </a:prstGeom>
+          <a:noFill/>
+          <a:ln w="9525">
+            <a:noFill/>
+            <a:miter lim="800000"/>
+            <a:headEnd/>
+            <a:tailEnd/>
+          </a:ln>
+        </p:spPr>
+      </p:pic>
+      <p:sp>
+        <p:nvSpPr>
+          <p:cNvPr id="8" name="Footer Placeholder 7"/>
+          <p:cNvSpPr>
+            <a:spLocks noGrp="1"/>
+          </p:cNvSpPr>
+          <p:nvPr>
+            <p:ph type="ftr" sz="quarter" idx="10"/>
+          </p:nvPr>
+        </p:nvSpPr>
+        <p:spPr/>
+        <p:txBody>
+          <a:bodyPr/>
+          <a:lstStyle/>
+          <a:p>
+            <a:r>
+              <a:rPr lang="en-US" smtClean="0"/>
+              <a:t>Professor Dong Washington University, St. Louis MO</a:t>
+            </a:r>
+            <a:endParaRPr lang="en-US" dirty="0"/>
+          </a:p>
+        </p:txBody>
+      </p:sp>
+      <p:sp>
+        <p:nvSpPr>
+          <p:cNvPr id="2" name="Date Placeholder 1"/>
+          <p:cNvSpPr>
+            <a:spLocks noGrp="1"/>
+          </p:cNvSpPr>
+          <p:nvPr>
+            <p:ph type="dt" sz="half" idx="12"/>
+          </p:nvPr>
+        </p:nvSpPr>
+        <p:spPr/>
+        <p:txBody>
+          <a:bodyPr/>
+          <a:lstStyle/>
+          <a:p>
+            <a:r>
+              <a:rPr lang="en-US" smtClean="0"/>
+              <a:t>9/9/2013</a:t>
+            </a:r>
+            <a:endParaRPr lang="en-US"/>
+          </a:p>
+        </p:txBody>
+      </p:sp>
+    </p:spTree>
+    <p:extLst>
+      <p:ext uri="{BB962C8B-B14F-4D97-AF65-F5344CB8AC3E}">
+        <p14:creationId xmlns:p14="http://schemas.microsoft.com/office/powerpoint/2010/main" val="872758598"/>
+      </p:ext>
+    </p:extLst>
+  </p:cSld>
+  <p:clrMapOvr>
+    <a:masterClrMapping/>
+  </p:clrMapOvr>
+  <p:timing>
+    <p:tnLst>
+      <p:par>
+        <p:cTn xmlns:p14="http://schemas.microsoft.com/office/powerpoint/2010/main" id="1" dur="indefinite" restart="never" nodeType="tmRoot"/>
+      </p:par>
+    </p:tnLst>
+  </p:timing>
+</p:sld>
+</file>
+
+<file path=ppt/slides/slide8.xml><?xml version="1.0" encoding="utf-8"?>
+<p:sld xmlns:a="http://schemas.openxmlformats.org/drawingml/2006/main" xmlns:r="http://schemas.openxmlformats.org/officeDocument/2006/relationships" xmlns:p="http://schemas.openxmlformats.org/presentationml/2006/main">
+  <p:cSld>
+    <p:spTree>
+      <p:nvGrpSpPr>
+        <p:cNvPr id="1" name=""/>
+        <p:cNvGrpSpPr/>
+        <p:nvPr/>
+      </p:nvGrpSpPr>
+      <p:grpSpPr>
+        <a:xfrm>
+          <a:off x="0" y="0"/>
+          <a:ext cx="0" cy="0"/>
+          <a:chOff x="0" y="0"/>
+          <a:chExt cx="0" cy="0"/>
+        </a:xfrm>
+      </p:grpSpPr>
+      <p:sp>
+        <p:nvSpPr>
           <p:cNvPr id="15363" name="Slide Number Placeholder 6"/>
           <p:cNvSpPr>
             <a:spLocks noGrp="1"/>
@@ -14670,7 +15686,7 @@
                 <a:latin typeface="Century Gothic" charset="0"/>
               </a:rPr>
               <a:pPr/>
-              <a:t>7</a:t>
+              <a:t>8</a:t>
             </a:fld>
             <a:endParaRPr lang="en-US">
               <a:latin typeface="Century Gothic" charset="0"/>
@@ -15627,7 +16643,7 @@
 </p:sld>
 </file>
 
-<file path=ppt/slides/slide8.xml><?xml version="1.0" encoding="utf-8"?>
+<file path=ppt/slides/slide9.xml><?xml version="1.0" encoding="utf-8"?>
 <p:sld xmlns:a="http://schemas.openxmlformats.org/drawingml/2006/main" xmlns:r="http://schemas.openxmlformats.org/officeDocument/2006/relationships" xmlns:p="http://schemas.openxmlformats.org/presentationml/2006/main">
   <p:cSld>
     <p:spTree>
@@ -15671,7 +16687,7 @@
                 <a:latin typeface="Century Gothic" charset="0"/>
               </a:rPr>
               <a:pPr/>
-              <a:t>8</a:t>
+              <a:t>9</a:t>
             </a:fld>
             <a:endParaRPr lang="en-US">
               <a:latin typeface="Century Gothic" charset="0"/>
@@ -16556,626 +17572,6 @@
     <p:bldLst>
       <p:bldP spid="167945" grpId="0" animBg="1"/>
     </p:bldLst>
-  </p:timing>
-</p:sld>
-</file>
-
-<file path=ppt/slides/slide9.xml><?xml version="1.0" encoding="utf-8"?>
-<p:sld xmlns:a="http://schemas.openxmlformats.org/drawingml/2006/main" xmlns:r="http://schemas.openxmlformats.org/officeDocument/2006/relationships" xmlns:p="http://schemas.openxmlformats.org/presentationml/2006/main">
-  <p:cSld>
-    <p:spTree>
-      <p:nvGrpSpPr>
-        <p:cNvPr id="1" name=""/>
-        <p:cNvGrpSpPr/>
-        <p:nvPr/>
-      </p:nvGrpSpPr>
-      <p:grpSpPr>
-        <a:xfrm>
-          <a:off x="0" y="0"/>
-          <a:ext cx="0" cy="0"/>
-          <a:chOff x="0" y="0"/>
-          <a:chExt cx="0" cy="0"/>
-        </a:xfrm>
-      </p:grpSpPr>
-      <p:sp>
-        <p:nvSpPr>
-          <p:cNvPr id="17411" name="Slide Number Placeholder 6"/>
-          <p:cNvSpPr>
-            <a:spLocks noGrp="1"/>
-          </p:cNvSpPr>
-          <p:nvPr>
-            <p:ph type="sldNum" sz="quarter" idx="12"/>
-          </p:nvPr>
-        </p:nvSpPr>
-        <p:spPr>
-          <a:noFill/>
-        </p:spPr>
-        <p:txBody>
-          <a:bodyPr/>
-          <a:lstStyle/>
-          <a:p>
-            <a:endParaRPr lang="en-US">
-              <a:latin typeface="Century Gothic" charset="0"/>
-            </a:endParaRPr>
-          </a:p>
-          <a:p>
-            <a:fld id="{9A5AC5BC-D237-A64D-A4AD-07301A1EFF4D}" type="slidenum">
-              <a:rPr lang="en-US">
-                <a:latin typeface="Century Gothic" charset="0"/>
-              </a:rPr>
-              <a:pPr/>
-              <a:t>9</a:t>
-            </a:fld>
-            <a:endParaRPr lang="en-US">
-              <a:latin typeface="Century Gothic" charset="0"/>
-            </a:endParaRPr>
-          </a:p>
-        </p:txBody>
-      </p:sp>
-      <p:sp>
-        <p:nvSpPr>
-          <p:cNvPr id="17412" name="Rectangle 2"/>
-          <p:cNvSpPr>
-            <a:spLocks noGrp="1" noChangeArrowheads="1"/>
-          </p:cNvSpPr>
-          <p:nvPr>
-            <p:ph type="title"/>
-          </p:nvPr>
-        </p:nvSpPr>
-        <p:spPr/>
-        <p:txBody>
-          <a:bodyPr/>
-          <a:lstStyle/>
-          <a:p>
-            <a:r>
-              <a:rPr lang="en-US">
-                <a:latin typeface="Century Gothic" charset="0"/>
-              </a:rPr>
-              <a:t>Special Cases of LP Solution:</a:t>
-            </a:r>
-            <a:br>
-              <a:rPr lang="en-US">
-                <a:latin typeface="Century Gothic" charset="0"/>
-              </a:rPr>
-            </a:br>
-            <a:r>
-              <a:rPr lang="en-US">
-                <a:latin typeface="Century Gothic" charset="0"/>
-              </a:rPr>
-              <a:t>Unbounded Problem</a:t>
-            </a:r>
-          </a:p>
-        </p:txBody>
-      </p:sp>
-      <p:sp>
-        <p:nvSpPr>
-          <p:cNvPr id="17413" name="Rectangle 3"/>
-          <p:cNvSpPr>
-            <a:spLocks noGrp="1" noChangeArrowheads="1"/>
-          </p:cNvSpPr>
-          <p:nvPr>
-            <p:ph type="body" sz="half" idx="1"/>
-          </p:nvPr>
-        </p:nvSpPr>
-        <p:spPr>
-          <a:xfrm>
-            <a:off x="533400" y="1905000"/>
-            <a:ext cx="5791200" cy="457200"/>
-          </a:xfrm>
-        </p:spPr>
-        <p:txBody>
-          <a:bodyPr/>
-          <a:lstStyle/>
-          <a:p>
-            <a:pPr>
-              <a:buFontTx/>
-              <a:buNone/>
-            </a:pPr>
-            <a:r>
-              <a:rPr lang="en-US" sz="1800">
-                <a:latin typeface="Century Gothic" charset="0"/>
-              </a:rPr>
-              <a:t>Suppose we have the following problem: </a:t>
-            </a:r>
-          </a:p>
-        </p:txBody>
-      </p:sp>
-      <p:sp>
-        <p:nvSpPr>
-          <p:cNvPr id="17414" name="Rectangle 4"/>
-          <p:cNvSpPr>
-            <a:spLocks noChangeArrowheads="1"/>
-          </p:cNvSpPr>
-          <p:nvPr/>
-        </p:nvSpPr>
-        <p:spPr bwMode="auto">
-          <a:xfrm>
-            <a:off x="1447800" y="2590800"/>
-            <a:ext cx="3429000" cy="1465263"/>
-          </a:xfrm>
-          <a:prstGeom prst="rect">
-            <a:avLst/>
-          </a:prstGeom>
-          <a:noFill/>
-          <a:ln w="9525">
-            <a:noFill/>
-            <a:miter lim="800000"/>
-            <a:headEnd/>
-            <a:tailEnd/>
-          </a:ln>
-        </p:spPr>
-        <p:txBody>
-          <a:bodyPr>
-            <a:prstTxWarp prst="textNoShape">
-              <a:avLst/>
-            </a:prstTxWarp>
-            <a:spAutoFit/>
-          </a:bodyPr>
-          <a:lstStyle/>
-          <a:p>
-            <a:pPr algn="l"/>
-            <a:r>
-              <a:rPr lang="en-US" dirty="0">
-                <a:solidFill>
-                  <a:schemeClr val="accent2"/>
-                </a:solidFill>
-                <a:latin typeface="Lucida Sans" charset="0"/>
-              </a:rPr>
-              <a:t>Maximize </a:t>
-            </a:r>
-            <a:r>
-              <a:rPr lang="en-US" i="1" dirty="0">
-                <a:solidFill>
-                  <a:schemeClr val="accent2"/>
-                </a:solidFill>
-                <a:latin typeface="Lucida Sans" charset="0"/>
-              </a:rPr>
-              <a:t>10 x</a:t>
-            </a:r>
-            <a:r>
-              <a:rPr lang="en-US" i="1" baseline="-25000" dirty="0">
-                <a:solidFill>
-                  <a:schemeClr val="accent2"/>
-                </a:solidFill>
-                <a:latin typeface="Lucida Sans" charset="0"/>
-              </a:rPr>
-              <a:t>1</a:t>
-            </a:r>
-            <a:r>
-              <a:rPr lang="en-US" i="1" dirty="0">
-                <a:solidFill>
-                  <a:schemeClr val="accent2"/>
-                </a:solidFill>
-                <a:latin typeface="Lucida Sans" charset="0"/>
-              </a:rPr>
-              <a:t> + 9 x</a:t>
-            </a:r>
-            <a:r>
-              <a:rPr lang="en-US" i="1" baseline="-25000" dirty="0">
-                <a:solidFill>
-                  <a:schemeClr val="accent2"/>
-                </a:solidFill>
-                <a:latin typeface="Lucida Sans" charset="0"/>
-              </a:rPr>
-              <a:t>2</a:t>
-            </a:r>
-          </a:p>
-          <a:p>
-            <a:pPr algn="l"/>
-            <a:r>
-              <a:rPr lang="en-US" dirty="0">
-                <a:latin typeface="Lucida Sans" charset="0"/>
-              </a:rPr>
-              <a:t>Such that: </a:t>
-            </a:r>
-          </a:p>
-          <a:p>
-            <a:pPr algn="l"/>
-            <a:r>
-              <a:rPr lang="en-US" dirty="0">
-                <a:latin typeface="Lucida Sans" charset="0"/>
-              </a:rPr>
-              <a:t>     </a:t>
-            </a:r>
-            <a:r>
-              <a:rPr lang="en-US" b="1" i="1" dirty="0">
-                <a:solidFill>
-                  <a:srgbClr val="FF3300"/>
-                </a:solidFill>
-                <a:latin typeface="Lucida Sans" charset="0"/>
-                <a:sym typeface="Symbol" charset="2"/>
-              </a:rPr>
-              <a:t>x</a:t>
-            </a:r>
-            <a:r>
-              <a:rPr lang="en-US" b="1" i="1" baseline="-25000" dirty="0">
-                <a:solidFill>
-                  <a:srgbClr val="FF3300"/>
-                </a:solidFill>
-                <a:latin typeface="Lucida Sans" charset="0"/>
-                <a:sym typeface="Symbol" charset="2"/>
-              </a:rPr>
-              <a:t>1</a:t>
-            </a:r>
-            <a:r>
-              <a:rPr lang="en-US" b="1" dirty="0">
-                <a:solidFill>
-                  <a:srgbClr val="FF3300"/>
-                </a:solidFill>
-                <a:latin typeface="Lucida Sans" charset="0"/>
-                <a:sym typeface="Symbol" charset="2"/>
-              </a:rPr>
-              <a:t>     +    </a:t>
-            </a:r>
-            <a:r>
-              <a:rPr lang="en-US" b="1" i="1" dirty="0">
-                <a:solidFill>
-                  <a:srgbClr val="FF3300"/>
-                </a:solidFill>
-                <a:latin typeface="Lucida Sans" charset="0"/>
-                <a:sym typeface="Symbol" charset="2"/>
-              </a:rPr>
-              <a:t>x</a:t>
-            </a:r>
-            <a:r>
-              <a:rPr lang="en-US" b="1" i="1" baseline="-25000" dirty="0">
-                <a:solidFill>
-                  <a:srgbClr val="FF3300"/>
-                </a:solidFill>
-                <a:latin typeface="Lucida Sans" charset="0"/>
-                <a:sym typeface="Symbol" charset="2"/>
-              </a:rPr>
-              <a:t>2</a:t>
-            </a:r>
-            <a:r>
-              <a:rPr lang="en-US" b="1" baseline="-25000" dirty="0">
-                <a:solidFill>
-                  <a:srgbClr val="FF3300"/>
-                </a:solidFill>
-                <a:latin typeface="Lucida Sans" charset="0"/>
-                <a:sym typeface="Symbol" charset="2"/>
-              </a:rPr>
-              <a:t> </a:t>
-            </a:r>
-            <a:r>
-              <a:rPr lang="en-US" b="1" dirty="0">
-                <a:solidFill>
-                  <a:srgbClr val="FF3300"/>
-                </a:solidFill>
-                <a:latin typeface="Lucida Sans" charset="0"/>
-                <a:sym typeface="Symbol" charset="2"/>
-              </a:rPr>
-              <a:t> </a:t>
-            </a:r>
-            <a:r>
-              <a:rPr lang="en-US" b="1" dirty="0" smtClean="0">
-                <a:solidFill>
-                  <a:srgbClr val="FF3300"/>
-                </a:solidFill>
-                <a:latin typeface="Lucida Sans" charset="0"/>
-                <a:sym typeface="Symbol" charset="2"/>
-              </a:rPr>
-              <a:t> ≥ </a:t>
-            </a:r>
-            <a:r>
-              <a:rPr lang="en-US" b="1" dirty="0">
-                <a:solidFill>
-                  <a:srgbClr val="FF3300"/>
-                </a:solidFill>
-                <a:latin typeface="Lucida Sans" charset="0"/>
-                <a:sym typeface="Symbol" charset="2"/>
-              </a:rPr>
-              <a:t>1000</a:t>
-            </a:r>
-            <a:r>
-              <a:rPr lang="en-US" b="1" dirty="0">
-                <a:latin typeface="Lucida Sans" charset="0"/>
-                <a:sym typeface="Symbol" charset="2"/>
-              </a:rPr>
-              <a:t> </a:t>
-            </a:r>
-            <a:endParaRPr lang="en-US" b="1" dirty="0">
-              <a:solidFill>
-                <a:schemeClr val="accent2"/>
-              </a:solidFill>
-              <a:latin typeface="Lucida Sans" charset="0"/>
-              <a:sym typeface="Symbol" charset="2"/>
-            </a:endParaRPr>
-          </a:p>
-          <a:p>
-            <a:pPr algn="l"/>
-            <a:r>
-              <a:rPr lang="en-US" b="1" dirty="0">
-                <a:solidFill>
-                  <a:schemeClr val="accent2"/>
-                </a:solidFill>
-                <a:latin typeface="Lucida Sans" charset="0"/>
-                <a:sym typeface="Symbol" charset="2"/>
-              </a:rPr>
-              <a:t>    </a:t>
-            </a:r>
-            <a:r>
-              <a:rPr lang="en-US" b="1" i="1" dirty="0">
-                <a:solidFill>
-                  <a:srgbClr val="FF3300"/>
-                </a:solidFill>
-                <a:latin typeface="Lucida Sans" charset="0"/>
-                <a:sym typeface="Symbol" charset="2"/>
-              </a:rPr>
-              <a:t>x</a:t>
-            </a:r>
-            <a:r>
-              <a:rPr lang="en-US" b="1" i="1" baseline="-25000" dirty="0">
-                <a:solidFill>
-                  <a:srgbClr val="FF3300"/>
-                </a:solidFill>
-                <a:latin typeface="Lucida Sans" charset="0"/>
-                <a:sym typeface="Symbol" charset="2"/>
-              </a:rPr>
-              <a:t>1</a:t>
-            </a:r>
-            <a:r>
-              <a:rPr lang="en-US" b="1" baseline="-25000" dirty="0">
-                <a:solidFill>
-                  <a:srgbClr val="FF3300"/>
-                </a:solidFill>
-                <a:latin typeface="Lucida Sans" charset="0"/>
-                <a:sym typeface="Symbol" charset="2"/>
-              </a:rPr>
-              <a:t> </a:t>
-            </a:r>
-            <a:r>
-              <a:rPr lang="en-US" b="1" dirty="0">
-                <a:solidFill>
-                  <a:srgbClr val="FF3300"/>
-                </a:solidFill>
-                <a:latin typeface="Lucida Sans" charset="0"/>
-                <a:sym typeface="Symbol" charset="2"/>
-              </a:rPr>
-              <a:t>                 </a:t>
-            </a:r>
-            <a:r>
-              <a:rPr lang="en-US" b="1" dirty="0" smtClean="0">
-                <a:solidFill>
-                  <a:srgbClr val="FF3300"/>
-                </a:solidFill>
-                <a:latin typeface="Lucida Sans" charset="0"/>
-                <a:sym typeface="Symbol" charset="2"/>
-              </a:rPr>
-              <a:t> ≥ </a:t>
-            </a:r>
-            <a:r>
-              <a:rPr lang="en-US" b="1" dirty="0">
-                <a:solidFill>
-                  <a:srgbClr val="FF3300"/>
-                </a:solidFill>
-                <a:latin typeface="Lucida Sans" charset="0"/>
-                <a:sym typeface="Symbol" charset="2"/>
-              </a:rPr>
-              <a:t>725</a:t>
-            </a:r>
-            <a:endParaRPr lang="en-US" b="1" i="1" dirty="0">
-              <a:solidFill>
-                <a:schemeClr val="accent2"/>
-              </a:solidFill>
-              <a:latin typeface="Lucida Sans" charset="0"/>
-              <a:sym typeface="Symbol" charset="2"/>
-            </a:endParaRPr>
-          </a:p>
-          <a:p>
-            <a:pPr algn="l"/>
-            <a:r>
-              <a:rPr lang="en-US" dirty="0">
-                <a:latin typeface="Lucida Sans" charset="0"/>
-              </a:rPr>
-              <a:t>   </a:t>
-            </a:r>
-            <a:r>
-              <a:rPr lang="en-US" i="1" dirty="0">
-                <a:solidFill>
-                  <a:schemeClr val="accent2"/>
-                </a:solidFill>
-                <a:latin typeface="Lucida Sans" charset="0"/>
-              </a:rPr>
-              <a:t>x</a:t>
-            </a:r>
-            <a:r>
-              <a:rPr lang="en-US" i="1" baseline="-25000" dirty="0">
-                <a:solidFill>
-                  <a:schemeClr val="accent2"/>
-                </a:solidFill>
-                <a:latin typeface="Lucida Sans" charset="0"/>
-              </a:rPr>
-              <a:t>1</a:t>
-            </a:r>
-            <a:r>
-              <a:rPr lang="en-US" i="1" dirty="0" smtClean="0">
-                <a:solidFill>
-                  <a:schemeClr val="accent2"/>
-                </a:solidFill>
-                <a:latin typeface="Lucida Sans" charset="0"/>
-              </a:rPr>
-              <a:t> ≥</a:t>
-            </a:r>
-            <a:r>
-              <a:rPr lang="en-US" dirty="0" smtClean="0">
-                <a:solidFill>
-                  <a:schemeClr val="accent2"/>
-                </a:solidFill>
-                <a:latin typeface="Lucida Sans" charset="0"/>
-                <a:sym typeface="Symbol" charset="2"/>
-              </a:rPr>
-              <a:t> </a:t>
-            </a:r>
-            <a:r>
-              <a:rPr lang="en-US" dirty="0">
-                <a:solidFill>
-                  <a:schemeClr val="accent2"/>
-                </a:solidFill>
-                <a:latin typeface="Lucida Sans" charset="0"/>
-                <a:sym typeface="Symbol" charset="2"/>
-              </a:rPr>
-              <a:t>0</a:t>
-            </a:r>
-            <a:r>
-              <a:rPr lang="en-US" dirty="0">
-                <a:solidFill>
-                  <a:schemeClr val="accent2"/>
-                </a:solidFill>
-                <a:latin typeface="Lucida Sans" charset="0"/>
-              </a:rPr>
-              <a:t> ,</a:t>
-            </a:r>
-            <a:r>
-              <a:rPr lang="en-US" i="1" dirty="0">
-                <a:solidFill>
-                  <a:schemeClr val="accent2"/>
-                </a:solidFill>
-                <a:latin typeface="Lucida Sans" charset="0"/>
-              </a:rPr>
-              <a:t>      x</a:t>
-            </a:r>
-            <a:r>
-              <a:rPr lang="en-US" i="1" baseline="-25000" dirty="0">
-                <a:solidFill>
-                  <a:schemeClr val="accent2"/>
-                </a:solidFill>
-                <a:latin typeface="Lucida Sans" charset="0"/>
-              </a:rPr>
-              <a:t>2</a:t>
-            </a:r>
-            <a:r>
-              <a:rPr lang="en-US" i="1" dirty="0">
-                <a:solidFill>
-                  <a:schemeClr val="accent2"/>
-                </a:solidFill>
-                <a:latin typeface="Lucida Sans" charset="0"/>
-              </a:rPr>
-              <a:t> </a:t>
-            </a:r>
-            <a:r>
-              <a:rPr lang="en-US" i="1" dirty="0" smtClean="0">
-                <a:solidFill>
-                  <a:schemeClr val="accent2"/>
-                </a:solidFill>
-                <a:latin typeface="Lucida Sans" charset="0"/>
-              </a:rPr>
-              <a:t> ≥</a:t>
-            </a:r>
-            <a:r>
-              <a:rPr lang="en-US" dirty="0" smtClean="0">
-                <a:solidFill>
-                  <a:schemeClr val="accent2"/>
-                </a:solidFill>
-                <a:latin typeface="Lucida Sans" charset="0"/>
-                <a:sym typeface="Symbol" charset="2"/>
-              </a:rPr>
-              <a:t> </a:t>
-            </a:r>
-            <a:r>
-              <a:rPr lang="en-US" dirty="0">
-                <a:solidFill>
-                  <a:schemeClr val="accent2"/>
-                </a:solidFill>
-                <a:latin typeface="Lucida Sans" charset="0"/>
-                <a:sym typeface="Symbol" charset="2"/>
-              </a:rPr>
-              <a:t>0</a:t>
-            </a:r>
-          </a:p>
-        </p:txBody>
-      </p:sp>
-      <p:pic>
-        <p:nvPicPr>
-          <p:cNvPr id="17415" name="Picture 9"/>
-          <p:cNvPicPr>
-            <a:picLocks noChangeAspect="1" noChangeArrowheads="1"/>
-          </p:cNvPicPr>
-          <p:nvPr/>
-        </p:nvPicPr>
-        <p:blipFill>
-          <a:blip r:embed="rId2" cstate="print"/>
-          <a:srcRect/>
-          <a:stretch>
-            <a:fillRect/>
-          </a:stretch>
-        </p:blipFill>
-        <p:spPr bwMode="auto">
-          <a:xfrm>
-            <a:off x="228600" y="4495800"/>
-            <a:ext cx="6400800" cy="3165475"/>
-          </a:xfrm>
-          <a:prstGeom prst="rect">
-            <a:avLst/>
-          </a:prstGeom>
-          <a:noFill/>
-          <a:ln w="9525">
-            <a:noFill/>
-            <a:miter lim="800000"/>
-            <a:headEnd/>
-            <a:tailEnd/>
-          </a:ln>
-        </p:spPr>
-      </p:pic>
-      <p:sp>
-        <p:nvSpPr>
-          <p:cNvPr id="17416" name="Date Placeholder 3"/>
-          <p:cNvSpPr>
-            <a:spLocks noGrp="1"/>
-          </p:cNvSpPr>
-          <p:nvPr>
-            <p:ph type="dt" sz="quarter" idx="10"/>
-          </p:nvPr>
-        </p:nvSpPr>
-        <p:spPr>
-          <a:noFill/>
-        </p:spPr>
-        <p:txBody>
-          <a:bodyPr/>
-          <a:lstStyle/>
-          <a:p>
-            <a:r>
-              <a:rPr lang="en-US" smtClean="0"/>
-              <a:t>9/11/2013, 9/16/2013</a:t>
-            </a:r>
-            <a:endParaRPr lang="en-US" dirty="0"/>
-          </a:p>
-        </p:txBody>
-      </p:sp>
-      <p:sp>
-        <p:nvSpPr>
-          <p:cNvPr id="8" name="Footer Placeholder 7"/>
-          <p:cNvSpPr>
-            <a:spLocks noGrp="1"/>
-          </p:cNvSpPr>
-          <p:nvPr>
-            <p:ph type="ftr" sz="quarter" idx="11"/>
-          </p:nvPr>
-        </p:nvSpPr>
-        <p:spPr/>
-        <p:txBody>
-          <a:bodyPr/>
-          <a:lstStyle/>
-          <a:p>
-            <a:r>
-              <a:rPr lang="en-US" smtClean="0"/>
-              <a:t>Professor Dong Washington University, St. Louis, MO</a:t>
-            </a:r>
-            <a:endParaRPr lang="en-US" dirty="0"/>
-          </a:p>
-        </p:txBody>
-      </p:sp>
-    </p:spTree>
-  </p:cSld>
-  <p:clrMapOvr>
-    <a:masterClrMapping/>
-  </p:clrMapOvr>
-  <p:timing>
-    <p:tnLst>
-      <p:par>
-        <p:cTn xmlns:p14="http://schemas.microsoft.com/office/powerpoint/2010/main" id="1" dur="indefinite" restart="never" nodeType="tmRoot"/>
-      </p:par>
-    </p:tnLst>
   </p:timing>
 </p:sld>
 </file>

</xml_diff>